<commit_message>
upload SELF TEST code and updated PPT
</commit_message>
<xml_diff>
--- a/PingPongCathcher_Diagram.pptx
+++ b/PingPongCathcher_Diagram.pptx
@@ -117,7 +117,7 @@
 <file path=ppt/revisionInfo.xml><?xml version="1.0" encoding="utf-8"?>
 <p1510:revInfo xmlns:a="http://schemas.openxmlformats.org/drawingml/2006/main" xmlns:r="http://schemas.openxmlformats.org/officeDocument/2006/relationships" xmlns:p1510="http://schemas.microsoft.com/office/powerpoint/2015/10/main">
   <p1510:revLst>
-    <p1510:client id="{6C466113-2838-427E-8A44-C4C1CDF4564F}" v="34" dt="2024-10-31T18:08:40.111"/>
+    <p1510:client id="{0B30E973-62CE-467F-89B1-575997BF363B}" v="4" dt="2024-12-04T17:58:36.987"/>
   </p1510:revLst>
 </p1510:revInfo>
 </file>
@@ -639,6 +639,358 @@
             <ac:spMk id="1048" creationId="{69AD81F5-6010-93BF-5C0F-2D2CF9ED00D3}"/>
           </ac:spMkLst>
         </pc:spChg>
+      </pc:sldChg>
+    </pc:docChg>
+  </pc:docChgLst>
+  <pc:docChgLst>
+    <pc:chgData name="George Hariman" userId="944226f4-c0bd-444e-8152-728ae792d6b1" providerId="ADAL" clId="{0B30E973-62CE-467F-89B1-575997BF363B}"/>
+    <pc:docChg chg="custSel modSld">
+      <pc:chgData name="George Hariman" userId="944226f4-c0bd-444e-8152-728ae792d6b1" providerId="ADAL" clId="{0B30E973-62CE-467F-89B1-575997BF363B}" dt="2024-12-04T17:59:44.536" v="93" actId="207"/>
+      <pc:docMkLst>
+        <pc:docMk/>
+      </pc:docMkLst>
+      <pc:sldChg chg="modSp mod">
+        <pc:chgData name="George Hariman" userId="944226f4-c0bd-444e-8152-728ae792d6b1" providerId="ADAL" clId="{0B30E973-62CE-467F-89B1-575997BF363B}" dt="2024-12-04T17:59:44.536" v="93" actId="207"/>
+        <pc:sldMkLst>
+          <pc:docMk/>
+          <pc:sldMk cId="927411034" sldId="257"/>
+        </pc:sldMkLst>
+        <pc:spChg chg="mod">
+          <ac:chgData name="George Hariman" userId="944226f4-c0bd-444e-8152-728ae792d6b1" providerId="ADAL" clId="{0B30E973-62CE-467F-89B1-575997BF363B}" dt="2024-12-04T17:58:36.987" v="3" actId="1076"/>
+          <ac:spMkLst>
+            <pc:docMk/>
+            <pc:sldMk cId="927411034" sldId="257"/>
+            <ac:spMk id="12" creationId="{C1729667-C6B9-7862-2F55-15CA0C23F3B8}"/>
+          </ac:spMkLst>
+        </pc:spChg>
+        <pc:spChg chg="mod">
+          <ac:chgData name="George Hariman" userId="944226f4-c0bd-444e-8152-728ae792d6b1" providerId="ADAL" clId="{0B30E973-62CE-467F-89B1-575997BF363B}" dt="2024-12-04T17:58:36.987" v="3" actId="1076"/>
+          <ac:spMkLst>
+            <pc:docMk/>
+            <pc:sldMk cId="927411034" sldId="257"/>
+            <ac:spMk id="24" creationId="{BFD0057F-2345-BCA7-A3E6-AE92AFDA9EFD}"/>
+          </ac:spMkLst>
+        </pc:spChg>
+        <pc:spChg chg="mod">
+          <ac:chgData name="George Hariman" userId="944226f4-c0bd-444e-8152-728ae792d6b1" providerId="ADAL" clId="{0B30E973-62CE-467F-89B1-575997BF363B}" dt="2024-12-04T17:58:36.987" v="3" actId="1076"/>
+          <ac:spMkLst>
+            <pc:docMk/>
+            <pc:sldMk cId="927411034" sldId="257"/>
+            <ac:spMk id="1040" creationId="{C2FA6720-E0AB-3C42-373A-0E7C21BA349B}"/>
+          </ac:spMkLst>
+        </pc:spChg>
+        <pc:spChg chg="mod">
+          <ac:chgData name="George Hariman" userId="944226f4-c0bd-444e-8152-728ae792d6b1" providerId="ADAL" clId="{0B30E973-62CE-467F-89B1-575997BF363B}" dt="2024-12-04T17:58:36.987" v="3" actId="1076"/>
+          <ac:spMkLst>
+            <pc:docMk/>
+            <pc:sldMk cId="927411034" sldId="257"/>
+            <ac:spMk id="1041" creationId="{D308CFE4-04A0-38B2-F73B-51D4D8C906F9}"/>
+          </ac:spMkLst>
+        </pc:spChg>
+        <pc:spChg chg="mod">
+          <ac:chgData name="George Hariman" userId="944226f4-c0bd-444e-8152-728ae792d6b1" providerId="ADAL" clId="{0B30E973-62CE-467F-89B1-575997BF363B}" dt="2024-12-04T17:58:36.987" v="3" actId="1076"/>
+          <ac:spMkLst>
+            <pc:docMk/>
+            <pc:sldMk cId="927411034" sldId="257"/>
+            <ac:spMk id="1047" creationId="{FD5042A2-4A32-CAAB-7A94-F554302A4432}"/>
+          </ac:spMkLst>
+        </pc:spChg>
+        <pc:spChg chg="mod">
+          <ac:chgData name="George Hariman" userId="944226f4-c0bd-444e-8152-728ae792d6b1" providerId="ADAL" clId="{0B30E973-62CE-467F-89B1-575997BF363B}" dt="2024-12-04T17:59:44.536" v="93" actId="207"/>
+          <ac:spMkLst>
+            <pc:docMk/>
+            <pc:sldMk cId="927411034" sldId="257"/>
+            <ac:spMk id="1048" creationId="{69AD81F5-6010-93BF-5C0F-2D2CF9ED00D3}"/>
+          </ac:spMkLst>
+        </pc:spChg>
+        <pc:spChg chg="mod">
+          <ac:chgData name="George Hariman" userId="944226f4-c0bd-444e-8152-728ae792d6b1" providerId="ADAL" clId="{0B30E973-62CE-467F-89B1-575997BF363B}" dt="2024-12-04T17:58:36.987" v="3" actId="1076"/>
+          <ac:spMkLst>
+            <pc:docMk/>
+            <pc:sldMk cId="927411034" sldId="257"/>
+            <ac:spMk id="1055" creationId="{48873E5A-D1D2-78E5-7521-ADEB34DE988E}"/>
+          </ac:spMkLst>
+        </pc:spChg>
+        <pc:spChg chg="mod">
+          <ac:chgData name="George Hariman" userId="944226f4-c0bd-444e-8152-728ae792d6b1" providerId="ADAL" clId="{0B30E973-62CE-467F-89B1-575997BF363B}" dt="2024-12-04T17:58:36.987" v="3" actId="1076"/>
+          <ac:spMkLst>
+            <pc:docMk/>
+            <pc:sldMk cId="927411034" sldId="257"/>
+            <ac:spMk id="1057" creationId="{F1135BED-8E99-2DFC-6111-E4C5022E9298}"/>
+          </ac:spMkLst>
+        </pc:spChg>
+        <pc:spChg chg="mod">
+          <ac:chgData name="George Hariman" userId="944226f4-c0bd-444e-8152-728ae792d6b1" providerId="ADAL" clId="{0B30E973-62CE-467F-89B1-575997BF363B}" dt="2024-12-04T17:58:36.987" v="3" actId="1076"/>
+          <ac:spMkLst>
+            <pc:docMk/>
+            <pc:sldMk cId="927411034" sldId="257"/>
+            <ac:spMk id="1060" creationId="{7CFB31E4-92AD-03B6-2FF2-92A9001FDA02}"/>
+          </ac:spMkLst>
+        </pc:spChg>
+        <pc:spChg chg="mod">
+          <ac:chgData name="George Hariman" userId="944226f4-c0bd-444e-8152-728ae792d6b1" providerId="ADAL" clId="{0B30E973-62CE-467F-89B1-575997BF363B}" dt="2024-12-04T17:58:36.987" v="3" actId="1076"/>
+          <ac:spMkLst>
+            <pc:docMk/>
+            <pc:sldMk cId="927411034" sldId="257"/>
+            <ac:spMk id="1061" creationId="{78607C36-AA16-6F38-AC1F-A4E2430F0F41}"/>
+          </ac:spMkLst>
+        </pc:spChg>
+        <pc:spChg chg="mod">
+          <ac:chgData name="George Hariman" userId="944226f4-c0bd-444e-8152-728ae792d6b1" providerId="ADAL" clId="{0B30E973-62CE-467F-89B1-575997BF363B}" dt="2024-12-04T17:58:36.987" v="3" actId="1076"/>
+          <ac:spMkLst>
+            <pc:docMk/>
+            <pc:sldMk cId="927411034" sldId="257"/>
+            <ac:spMk id="1062" creationId="{62BCB61E-B907-C039-7FCA-F272CC51D3BA}"/>
+          </ac:spMkLst>
+        </pc:spChg>
+        <pc:spChg chg="mod">
+          <ac:chgData name="George Hariman" userId="944226f4-c0bd-444e-8152-728ae792d6b1" providerId="ADAL" clId="{0B30E973-62CE-467F-89B1-575997BF363B}" dt="2024-12-04T17:58:36.987" v="3" actId="1076"/>
+          <ac:spMkLst>
+            <pc:docMk/>
+            <pc:sldMk cId="927411034" sldId="257"/>
+            <ac:spMk id="1063" creationId="{986DD84D-1AE7-7F6C-4268-C25DAC8657A1}"/>
+          </ac:spMkLst>
+        </pc:spChg>
+        <pc:spChg chg="mod">
+          <ac:chgData name="George Hariman" userId="944226f4-c0bd-444e-8152-728ae792d6b1" providerId="ADAL" clId="{0B30E973-62CE-467F-89B1-575997BF363B}" dt="2024-12-04T17:58:36.987" v="3" actId="1076"/>
+          <ac:spMkLst>
+            <pc:docMk/>
+            <pc:sldMk cId="927411034" sldId="257"/>
+            <ac:spMk id="1066" creationId="{3A3EE481-27A5-6EAC-6495-9151D17CB900}"/>
+          </ac:spMkLst>
+        </pc:spChg>
+        <pc:spChg chg="mod">
+          <ac:chgData name="George Hariman" userId="944226f4-c0bd-444e-8152-728ae792d6b1" providerId="ADAL" clId="{0B30E973-62CE-467F-89B1-575997BF363B}" dt="2024-12-04T17:58:36.987" v="3" actId="1076"/>
+          <ac:spMkLst>
+            <pc:docMk/>
+            <pc:sldMk cId="927411034" sldId="257"/>
+            <ac:spMk id="1067" creationId="{24272947-EB14-4914-7863-304FCE6F6CD7}"/>
+          </ac:spMkLst>
+        </pc:spChg>
+        <pc:spChg chg="mod">
+          <ac:chgData name="George Hariman" userId="944226f4-c0bd-444e-8152-728ae792d6b1" providerId="ADAL" clId="{0B30E973-62CE-467F-89B1-575997BF363B}" dt="2024-12-04T17:58:36.987" v="3" actId="1076"/>
+          <ac:spMkLst>
+            <pc:docMk/>
+            <pc:sldMk cId="927411034" sldId="257"/>
+            <ac:spMk id="1068" creationId="{C94B1C8E-6491-2EC3-2487-0546C1BF23BD}"/>
+          </ac:spMkLst>
+        </pc:spChg>
+        <pc:spChg chg="mod">
+          <ac:chgData name="George Hariman" userId="944226f4-c0bd-444e-8152-728ae792d6b1" providerId="ADAL" clId="{0B30E973-62CE-467F-89B1-575997BF363B}" dt="2024-12-04T17:58:36.987" v="3" actId="1076"/>
+          <ac:spMkLst>
+            <pc:docMk/>
+            <pc:sldMk cId="927411034" sldId="257"/>
+            <ac:spMk id="1084" creationId="{9F93EDEC-7873-12B7-DD54-F9C25E80E0DF}"/>
+          </ac:spMkLst>
+        </pc:spChg>
+        <pc:spChg chg="mod">
+          <ac:chgData name="George Hariman" userId="944226f4-c0bd-444e-8152-728ae792d6b1" providerId="ADAL" clId="{0B30E973-62CE-467F-89B1-575997BF363B}" dt="2024-12-04T17:58:36.987" v="3" actId="1076"/>
+          <ac:spMkLst>
+            <pc:docMk/>
+            <pc:sldMk cId="927411034" sldId="257"/>
+            <ac:spMk id="1086" creationId="{142D2E0D-349F-45FE-9108-D36BA11E216C}"/>
+          </ac:spMkLst>
+        </pc:spChg>
+        <pc:spChg chg="mod">
+          <ac:chgData name="George Hariman" userId="944226f4-c0bd-444e-8152-728ae792d6b1" providerId="ADAL" clId="{0B30E973-62CE-467F-89B1-575997BF363B}" dt="2024-12-04T17:58:36.987" v="3" actId="1076"/>
+          <ac:spMkLst>
+            <pc:docMk/>
+            <pc:sldMk cId="927411034" sldId="257"/>
+            <ac:spMk id="1090" creationId="{76093485-D9E0-EA7E-81F2-5BD87C289984}"/>
+          </ac:spMkLst>
+        </pc:spChg>
+        <pc:spChg chg="mod">
+          <ac:chgData name="George Hariman" userId="944226f4-c0bd-444e-8152-728ae792d6b1" providerId="ADAL" clId="{0B30E973-62CE-467F-89B1-575997BF363B}" dt="2024-12-04T17:58:36.987" v="3" actId="1076"/>
+          <ac:spMkLst>
+            <pc:docMk/>
+            <pc:sldMk cId="927411034" sldId="257"/>
+            <ac:spMk id="1091" creationId="{97631646-10FF-E127-2B5C-223FA2FCF8BC}"/>
+          </ac:spMkLst>
+        </pc:spChg>
+        <pc:spChg chg="mod">
+          <ac:chgData name="George Hariman" userId="944226f4-c0bd-444e-8152-728ae792d6b1" providerId="ADAL" clId="{0B30E973-62CE-467F-89B1-575997BF363B}" dt="2024-12-04T17:58:36.987" v="3" actId="1076"/>
+          <ac:spMkLst>
+            <pc:docMk/>
+            <pc:sldMk cId="927411034" sldId="257"/>
+            <ac:spMk id="1092" creationId="{035B62F3-EB53-207A-08E5-009A7EF74746}"/>
+          </ac:spMkLst>
+        </pc:spChg>
+        <pc:spChg chg="mod">
+          <ac:chgData name="George Hariman" userId="944226f4-c0bd-444e-8152-728ae792d6b1" providerId="ADAL" clId="{0B30E973-62CE-467F-89B1-575997BF363B}" dt="2024-12-04T17:58:36.987" v="3" actId="1076"/>
+          <ac:spMkLst>
+            <pc:docMk/>
+            <pc:sldMk cId="927411034" sldId="257"/>
+            <ac:spMk id="1093" creationId="{10CFD357-A251-37A5-5FAF-6BC143606524}"/>
+          </ac:spMkLst>
+        </pc:spChg>
+        <pc:spChg chg="mod">
+          <ac:chgData name="George Hariman" userId="944226f4-c0bd-444e-8152-728ae792d6b1" providerId="ADAL" clId="{0B30E973-62CE-467F-89B1-575997BF363B}" dt="2024-12-04T17:58:36.987" v="3" actId="1076"/>
+          <ac:spMkLst>
+            <pc:docMk/>
+            <pc:sldMk cId="927411034" sldId="257"/>
+            <ac:spMk id="1094" creationId="{D0A6565E-9B42-5670-7859-49782F9D9B37}"/>
+          </ac:spMkLst>
+        </pc:spChg>
+        <pc:grpChg chg="mod">
+          <ac:chgData name="George Hariman" userId="944226f4-c0bd-444e-8152-728ae792d6b1" providerId="ADAL" clId="{0B30E973-62CE-467F-89B1-575997BF363B}" dt="2024-12-04T17:58:36.987" v="3" actId="1076"/>
+          <ac:grpSpMkLst>
+            <pc:docMk/>
+            <pc:sldMk cId="927411034" sldId="257"/>
+            <ac:grpSpMk id="1095" creationId="{B1C3C2A1-190B-895F-F1B4-B218C7ACAE46}"/>
+          </ac:grpSpMkLst>
+        </pc:grpChg>
+        <pc:picChg chg="mod">
+          <ac:chgData name="George Hariman" userId="944226f4-c0bd-444e-8152-728ae792d6b1" providerId="ADAL" clId="{0B30E973-62CE-467F-89B1-575997BF363B}" dt="2024-12-04T17:58:36.987" v="3" actId="1076"/>
+          <ac:picMkLst>
+            <pc:docMk/>
+            <pc:sldMk cId="927411034" sldId="257"/>
+            <ac:picMk id="1026" creationId="{F7B1EDF7-AAF5-B7CF-960A-6503C1863859}"/>
+          </ac:picMkLst>
+        </pc:picChg>
+        <pc:picChg chg="mod">
+          <ac:chgData name="George Hariman" userId="944226f4-c0bd-444e-8152-728ae792d6b1" providerId="ADAL" clId="{0B30E973-62CE-467F-89B1-575997BF363B}" dt="2024-12-04T17:58:36.987" v="3" actId="1076"/>
+          <ac:picMkLst>
+            <pc:docMk/>
+            <pc:sldMk cId="927411034" sldId="257"/>
+            <ac:picMk id="1028" creationId="{6E9CEC33-8CA7-E5F1-C383-13328B869304}"/>
+          </ac:picMkLst>
+        </pc:picChg>
+        <pc:picChg chg="mod">
+          <ac:chgData name="George Hariman" userId="944226f4-c0bd-444e-8152-728ae792d6b1" providerId="ADAL" clId="{0B30E973-62CE-467F-89B1-575997BF363B}" dt="2024-12-04T17:58:36.987" v="3" actId="1076"/>
+          <ac:picMkLst>
+            <pc:docMk/>
+            <pc:sldMk cId="927411034" sldId="257"/>
+            <ac:picMk id="1051" creationId="{862055BF-0603-49CD-0CC0-099B921004D0}"/>
+          </ac:picMkLst>
+        </pc:picChg>
+        <pc:picChg chg="mod">
+          <ac:chgData name="George Hariman" userId="944226f4-c0bd-444e-8152-728ae792d6b1" providerId="ADAL" clId="{0B30E973-62CE-467F-89B1-575997BF363B}" dt="2024-12-04T17:58:36.987" v="3" actId="1076"/>
+          <ac:picMkLst>
+            <pc:docMk/>
+            <pc:sldMk cId="927411034" sldId="257"/>
+            <ac:picMk id="1059" creationId="{650DACB8-8C79-AC02-98CD-9DF3AE95FDBA}"/>
+          </ac:picMkLst>
+        </pc:picChg>
+        <pc:picChg chg="mod">
+          <ac:chgData name="George Hariman" userId="944226f4-c0bd-444e-8152-728ae792d6b1" providerId="ADAL" clId="{0B30E973-62CE-467F-89B1-575997BF363B}" dt="2024-12-04T17:58:36.987" v="3" actId="1076"/>
+          <ac:picMkLst>
+            <pc:docMk/>
+            <pc:sldMk cId="927411034" sldId="257"/>
+            <ac:picMk id="1085" creationId="{8EADC3D2-CEC5-158A-7F74-681E819486DF}"/>
+          </ac:picMkLst>
+        </pc:picChg>
+        <pc:cxnChg chg="mod">
+          <ac:chgData name="George Hariman" userId="944226f4-c0bd-444e-8152-728ae792d6b1" providerId="ADAL" clId="{0B30E973-62CE-467F-89B1-575997BF363B}" dt="2024-12-04T17:58:36.987" v="3" actId="1076"/>
+          <ac:cxnSpMkLst>
+            <pc:docMk/>
+            <pc:sldMk cId="927411034" sldId="257"/>
+            <ac:cxnSpMk id="6" creationId="{12D47944-4813-9B60-9CEF-461026621428}"/>
+          </ac:cxnSpMkLst>
+        </pc:cxnChg>
+        <pc:cxnChg chg="mod">
+          <ac:chgData name="George Hariman" userId="944226f4-c0bd-444e-8152-728ae792d6b1" providerId="ADAL" clId="{0B30E973-62CE-467F-89B1-575997BF363B}" dt="2024-12-04T17:58:36.987" v="3" actId="1076"/>
+          <ac:cxnSpMkLst>
+            <pc:docMk/>
+            <pc:sldMk cId="927411034" sldId="257"/>
+            <ac:cxnSpMk id="7" creationId="{DAFCB135-DDFD-7B55-FB93-5D4EA4D805F7}"/>
+          </ac:cxnSpMkLst>
+        </pc:cxnChg>
+        <pc:cxnChg chg="mod">
+          <ac:chgData name="George Hariman" userId="944226f4-c0bd-444e-8152-728ae792d6b1" providerId="ADAL" clId="{0B30E973-62CE-467F-89B1-575997BF363B}" dt="2024-12-04T17:58:36.987" v="3" actId="1076"/>
+          <ac:cxnSpMkLst>
+            <pc:docMk/>
+            <pc:sldMk cId="927411034" sldId="257"/>
+            <ac:cxnSpMk id="17" creationId="{1C05B4DF-8164-1AA2-455E-3F857B10C181}"/>
+          </ac:cxnSpMkLst>
+        </pc:cxnChg>
+        <pc:cxnChg chg="mod">
+          <ac:chgData name="George Hariman" userId="944226f4-c0bd-444e-8152-728ae792d6b1" providerId="ADAL" clId="{0B30E973-62CE-467F-89B1-575997BF363B}" dt="2024-12-04T17:58:36.987" v="3" actId="1076"/>
+          <ac:cxnSpMkLst>
+            <pc:docMk/>
+            <pc:sldMk cId="927411034" sldId="257"/>
+            <ac:cxnSpMk id="26" creationId="{F38B1FCF-894C-6420-76C6-ACAE83233D0D}"/>
+          </ac:cxnSpMkLst>
+        </pc:cxnChg>
+        <pc:cxnChg chg="mod">
+          <ac:chgData name="George Hariman" userId="944226f4-c0bd-444e-8152-728ae792d6b1" providerId="ADAL" clId="{0B30E973-62CE-467F-89B1-575997BF363B}" dt="2024-12-04T17:58:36.987" v="3" actId="1076"/>
+          <ac:cxnSpMkLst>
+            <pc:docMk/>
+            <pc:sldMk cId="927411034" sldId="257"/>
+            <ac:cxnSpMk id="29" creationId="{6DC7EFDB-7147-7BB1-F6C5-A5918DD0202C}"/>
+          </ac:cxnSpMkLst>
+        </pc:cxnChg>
+        <pc:cxnChg chg="mod">
+          <ac:chgData name="George Hariman" userId="944226f4-c0bd-444e-8152-728ae792d6b1" providerId="ADAL" clId="{0B30E973-62CE-467F-89B1-575997BF363B}" dt="2024-12-04T17:58:36.987" v="3" actId="1076"/>
+          <ac:cxnSpMkLst>
+            <pc:docMk/>
+            <pc:sldMk cId="927411034" sldId="257"/>
+            <ac:cxnSpMk id="1025" creationId="{8FA12E89-0D2A-72C8-11B6-AFE566315FCD}"/>
+          </ac:cxnSpMkLst>
+        </pc:cxnChg>
+        <pc:cxnChg chg="mod">
+          <ac:chgData name="George Hariman" userId="944226f4-c0bd-444e-8152-728ae792d6b1" providerId="ADAL" clId="{0B30E973-62CE-467F-89B1-575997BF363B}" dt="2024-12-04T17:58:36.987" v="3" actId="1076"/>
+          <ac:cxnSpMkLst>
+            <pc:docMk/>
+            <pc:sldMk cId="927411034" sldId="257"/>
+            <ac:cxnSpMk id="1033" creationId="{528CF66E-AD38-E2D2-AF7F-9E4AB92A9C27}"/>
+          </ac:cxnSpMkLst>
+        </pc:cxnChg>
+        <pc:cxnChg chg="mod">
+          <ac:chgData name="George Hariman" userId="944226f4-c0bd-444e-8152-728ae792d6b1" providerId="ADAL" clId="{0B30E973-62CE-467F-89B1-575997BF363B}" dt="2024-12-04T17:58:36.987" v="3" actId="1076"/>
+          <ac:cxnSpMkLst>
+            <pc:docMk/>
+            <pc:sldMk cId="927411034" sldId="257"/>
+            <ac:cxnSpMk id="1035" creationId="{6D58D9A1-69A0-A081-4A73-F1C6907C87A4}"/>
+          </ac:cxnSpMkLst>
+        </pc:cxnChg>
+        <pc:cxnChg chg="mod">
+          <ac:chgData name="George Hariman" userId="944226f4-c0bd-444e-8152-728ae792d6b1" providerId="ADAL" clId="{0B30E973-62CE-467F-89B1-575997BF363B}" dt="2024-12-04T17:58:36.987" v="3" actId="1076"/>
+          <ac:cxnSpMkLst>
+            <pc:docMk/>
+            <pc:sldMk cId="927411034" sldId="257"/>
+            <ac:cxnSpMk id="1042" creationId="{E7641C78-82B1-AE3E-8C75-F788598D4934}"/>
+          </ac:cxnSpMkLst>
+        </pc:cxnChg>
+        <pc:cxnChg chg="mod">
+          <ac:chgData name="George Hariman" userId="944226f4-c0bd-444e-8152-728ae792d6b1" providerId="ADAL" clId="{0B30E973-62CE-467F-89B1-575997BF363B}" dt="2024-12-04T17:58:36.987" v="3" actId="1076"/>
+          <ac:cxnSpMkLst>
+            <pc:docMk/>
+            <pc:sldMk cId="927411034" sldId="257"/>
+            <ac:cxnSpMk id="1044" creationId="{AC8017CD-1E1D-4453-1B5E-7153B548CC69}"/>
+          </ac:cxnSpMkLst>
+        </pc:cxnChg>
+        <pc:cxnChg chg="mod">
+          <ac:chgData name="George Hariman" userId="944226f4-c0bd-444e-8152-728ae792d6b1" providerId="ADAL" clId="{0B30E973-62CE-467F-89B1-575997BF363B}" dt="2024-12-04T17:58:36.987" v="3" actId="1076"/>
+          <ac:cxnSpMkLst>
+            <pc:docMk/>
+            <pc:sldMk cId="927411034" sldId="257"/>
+            <ac:cxnSpMk id="1052" creationId="{C6262A8B-F746-5142-91F6-5FA1DE9C2634}"/>
+          </ac:cxnSpMkLst>
+        </pc:cxnChg>
+        <pc:cxnChg chg="mod">
+          <ac:chgData name="George Hariman" userId="944226f4-c0bd-444e-8152-728ae792d6b1" providerId="ADAL" clId="{0B30E973-62CE-467F-89B1-575997BF363B}" dt="2024-12-04T17:58:36.987" v="3" actId="1076"/>
+          <ac:cxnSpMkLst>
+            <pc:docMk/>
+            <pc:sldMk cId="927411034" sldId="257"/>
+            <ac:cxnSpMk id="1064" creationId="{7A89C6B0-8058-75FB-4825-2FE89B524BEF}"/>
+          </ac:cxnSpMkLst>
+        </pc:cxnChg>
+        <pc:cxnChg chg="mod">
+          <ac:chgData name="George Hariman" userId="944226f4-c0bd-444e-8152-728ae792d6b1" providerId="ADAL" clId="{0B30E973-62CE-467F-89B1-575997BF363B}" dt="2024-12-04T17:58:36.987" v="3" actId="1076"/>
+          <ac:cxnSpMkLst>
+            <pc:docMk/>
+            <pc:sldMk cId="927411034" sldId="257"/>
+            <ac:cxnSpMk id="1072" creationId="{1D8CC8DE-8C5D-11EA-99D3-55F7BD456199}"/>
+          </ac:cxnSpMkLst>
+        </pc:cxnChg>
+        <pc:cxnChg chg="mod">
+          <ac:chgData name="George Hariman" userId="944226f4-c0bd-444e-8152-728ae792d6b1" providerId="ADAL" clId="{0B30E973-62CE-467F-89B1-575997BF363B}" dt="2024-12-04T17:58:36.987" v="3" actId="1076"/>
+          <ac:cxnSpMkLst>
+            <pc:docMk/>
+            <pc:sldMk cId="927411034" sldId="257"/>
+            <ac:cxnSpMk id="1074" creationId="{70A57AC9-D117-CE50-41D4-4396BCF479F2}"/>
+          </ac:cxnSpMkLst>
+        </pc:cxnChg>
       </pc:sldChg>
     </pc:docChg>
   </pc:docChgLst>
@@ -4382,10 +4734,10 @@
         </p:nvGrpSpPr>
         <p:grpSpPr>
           <a:xfrm>
-            <a:off x="0" y="729841"/>
-            <a:ext cx="12122092" cy="6128159"/>
-            <a:chOff x="0" y="729841"/>
-            <a:chExt cx="12122092" cy="6128159"/>
+            <a:off x="0" y="71815"/>
+            <a:ext cx="12122092" cy="6786185"/>
+            <a:chOff x="0" y="71815"/>
+            <a:chExt cx="12122092" cy="6786185"/>
           </a:xfrm>
         </p:grpSpPr>
         <p:pic>
@@ -5202,8 +5554,8 @@
           </p:nvSpPr>
           <p:spPr>
             <a:xfrm>
-              <a:off x="4527678" y="729841"/>
-              <a:ext cx="3776996" cy="2318583"/>
+              <a:off x="4151663" y="71815"/>
+              <a:ext cx="4100610" cy="2862322"/>
             </a:xfrm>
             <a:prstGeom prst="rect">
               <a:avLst/>
@@ -5376,6 +5728,82 @@
                   <a:cs typeface="メイリオ" panose="020B0604030504040204" pitchFamily="50" charset="-128"/>
                 </a:rPr>
                 <a:t>5 = ball in cup (H = in cup)</a:t>
+              </a:r>
+            </a:p>
+            <a:p>
+              <a:pPr>
+                <a:spcBef>
+                  <a:spcPts val="400"/>
+                </a:spcBef>
+              </a:pPr>
+              <a:r>
+                <a:rPr lang="en-US" sz="1600" dirty="0">
+                  <a:solidFill>
+                    <a:schemeClr val="tx2"/>
+                  </a:solidFill>
+                  <a:latin typeface="+mn-ea"/>
+                  <a:cs typeface="メイリオ" panose="020B0604030504040204" pitchFamily="50" charset="-128"/>
+                </a:rPr>
+                <a:t>4 = GND this to make </a:t>
+              </a:r>
+              <a:r>
+                <a:rPr lang="en-US" sz="1600" dirty="0">
+                  <a:solidFill>
+                    <a:srgbClr val="FF0000"/>
+                  </a:solidFill>
+                  <a:latin typeface="+mn-ea"/>
+                  <a:cs typeface="メイリオ" panose="020B0604030504040204" pitchFamily="50" charset="-128"/>
+                </a:rPr>
+                <a:t>SELF TEST </a:t>
+              </a:r>
+              <a:r>
+                <a:rPr lang="en-US" sz="1600" dirty="0">
+                  <a:solidFill>
+                    <a:schemeClr val="tx2"/>
+                  </a:solidFill>
+                  <a:latin typeface="+mn-ea"/>
+                  <a:cs typeface="メイリオ" panose="020B0604030504040204" pitchFamily="50" charset="-128"/>
+                </a:rPr>
+                <a:t>work</a:t>
+              </a:r>
+              <a:br>
+                <a:rPr lang="en-US" sz="1600" dirty="0">
+                  <a:solidFill>
+                    <a:schemeClr val="tx2"/>
+                  </a:solidFill>
+                  <a:latin typeface="+mn-ea"/>
+                  <a:cs typeface="メイリオ" panose="020B0604030504040204" pitchFamily="50" charset="-128"/>
+                </a:rPr>
+              </a:br>
+              <a:r>
+                <a:rPr lang="en-US" sz="1600" dirty="0">
+                  <a:solidFill>
+                    <a:schemeClr val="tx2"/>
+                  </a:solidFill>
+                  <a:latin typeface="+mn-ea"/>
+                  <a:cs typeface="メイリオ" panose="020B0604030504040204" pitchFamily="50" charset="-128"/>
+                </a:rPr>
+                <a:t>(when using “_</a:t>
+              </a:r>
+              <a:r>
+                <a:rPr lang="en-US" sz="1600" dirty="0" err="1">
+                  <a:solidFill>
+                    <a:schemeClr val="tx2"/>
+                  </a:solidFill>
+                  <a:latin typeface="+mn-ea"/>
+                  <a:cs typeface="メイリオ" panose="020B0604030504040204" pitchFamily="50" charset="-128"/>
+                </a:rPr>
+                <a:t>servo_selftest.ino</a:t>
+              </a:r>
+              <a:r>
+                <a:rPr lang="en-US" sz="1600" dirty="0">
+                  <a:solidFill>
+                    <a:schemeClr val="tx2"/>
+                  </a:solidFill>
+                  <a:latin typeface="+mn-ea"/>
+                  <a:cs typeface="メイリオ" panose="020B0604030504040204" pitchFamily="50" charset="-128"/>
+                </a:rPr>
+                <a:t>”)</a:t>
               </a:r>
             </a:p>
             <a:p>

</xml_diff>

<commit_message>
put correct part number info to PPT
</commit_message>
<xml_diff>
--- a/PingPongCathcher_Diagram.pptx
+++ b/PingPongCathcher_Diagram.pptx
@@ -117,7 +117,7 @@
 <file path=ppt/revisionInfo.xml><?xml version="1.0" encoding="utf-8"?>
 <p1510:revInfo xmlns:a="http://schemas.openxmlformats.org/drawingml/2006/main" xmlns:r="http://schemas.openxmlformats.org/officeDocument/2006/relationships" xmlns:p1510="http://schemas.microsoft.com/office/powerpoint/2015/10/main">
   <p1510:revLst>
-    <p1510:client id="{0B30E973-62CE-467F-89B1-575997BF363B}" v="4" dt="2024-12-04T17:58:36.987"/>
+    <p1510:client id="{FD4EFFFC-F49C-43EB-A90A-FC442D6D255B}" v="1" dt="2025-02-19T21:59:11.606"/>
   </p1510:revLst>
 </p1510:revInfo>
 </file>
@@ -137,22 +137,6 @@
           <pc:docMk/>
           <pc:sldMk cId="1992560637" sldId="256"/>
         </pc:sldMkLst>
-        <pc:spChg chg="mod">
-          <ac:chgData name="George Hariman" userId="944226f4-c0bd-444e-8152-728ae792d6b1" providerId="ADAL" clId="{8797DDE1-E717-4B82-8CB1-FB8A5736D5DA}" dt="2024-10-23T21:03:51.888" v="1"/>
-          <ac:spMkLst>
-            <pc:docMk/>
-            <pc:sldMk cId="1992560637" sldId="256"/>
-            <ac:spMk id="2" creationId="{1336D331-DDA6-5148-479E-E7E1C5CF21DB}"/>
-          </ac:spMkLst>
-        </pc:spChg>
-        <pc:spChg chg="mod">
-          <ac:chgData name="George Hariman" userId="944226f4-c0bd-444e-8152-728ae792d6b1" providerId="ADAL" clId="{8797DDE1-E717-4B82-8CB1-FB8A5736D5DA}" dt="2024-10-23T21:03:51.888" v="1"/>
-          <ac:spMkLst>
-            <pc:docMk/>
-            <pc:sldMk cId="1992560637" sldId="256"/>
-            <ac:spMk id="3" creationId="{2AD22923-FF87-A4AF-3661-08F518AC6D11}"/>
-          </ac:spMkLst>
-        </pc:spChg>
       </pc:sldChg>
       <pc:sldChg chg="addSp delSp modSp new mod">
         <pc:chgData name="George Hariman" userId="944226f4-c0bd-444e-8152-728ae792d6b1" providerId="ADAL" clId="{8797DDE1-E717-4B82-8CB1-FB8A5736D5DA}" dt="2024-10-23T21:40:26.067" v="1022" actId="20577"/>
@@ -160,446 +144,6 @@
           <pc:docMk/>
           <pc:sldMk cId="927411034" sldId="257"/>
         </pc:sldMkLst>
-        <pc:spChg chg="mod">
-          <ac:chgData name="George Hariman" userId="944226f4-c0bd-444e-8152-728ae792d6b1" providerId="ADAL" clId="{8797DDE1-E717-4B82-8CB1-FB8A5736D5DA}" dt="2024-10-23T21:40:26.067" v="1022" actId="20577"/>
-          <ac:spMkLst>
-            <pc:docMk/>
-            <pc:sldMk cId="927411034" sldId="257"/>
-            <ac:spMk id="2" creationId="{F4E32AA9-1618-F765-B95C-C3A8EB9C18DF}"/>
-          </ac:spMkLst>
-        </pc:spChg>
-        <pc:spChg chg="add del mod">
-          <ac:chgData name="George Hariman" userId="944226f4-c0bd-444e-8152-728ae792d6b1" providerId="ADAL" clId="{8797DDE1-E717-4B82-8CB1-FB8A5736D5DA}" dt="2024-10-23T21:11:23.138" v="88" actId="478"/>
-          <ac:spMkLst>
-            <pc:docMk/>
-            <pc:sldMk cId="927411034" sldId="257"/>
-            <ac:spMk id="9" creationId="{07B374EF-D3E6-D568-BD51-3067DEEA3D13}"/>
-          </ac:spMkLst>
-        </pc:spChg>
-        <pc:spChg chg="add mod">
-          <ac:chgData name="George Hariman" userId="944226f4-c0bd-444e-8152-728ae792d6b1" providerId="ADAL" clId="{8797DDE1-E717-4B82-8CB1-FB8A5736D5DA}" dt="2024-10-23T21:36:03.169" v="862" actId="164"/>
-          <ac:spMkLst>
-            <pc:docMk/>
-            <pc:sldMk cId="927411034" sldId="257"/>
-            <ac:spMk id="12" creationId="{C1729667-C6B9-7862-2F55-15CA0C23F3B8}"/>
-          </ac:spMkLst>
-        </pc:spChg>
-        <pc:spChg chg="add mod">
-          <ac:chgData name="George Hariman" userId="944226f4-c0bd-444e-8152-728ae792d6b1" providerId="ADAL" clId="{8797DDE1-E717-4B82-8CB1-FB8A5736D5DA}" dt="2024-10-23T21:36:03.169" v="862" actId="164"/>
-          <ac:spMkLst>
-            <pc:docMk/>
-            <pc:sldMk cId="927411034" sldId="257"/>
-            <ac:spMk id="24" creationId="{BFD0057F-2345-BCA7-A3E6-AE92AFDA9EFD}"/>
-          </ac:spMkLst>
-        </pc:spChg>
-        <pc:spChg chg="add mod">
-          <ac:chgData name="George Hariman" userId="944226f4-c0bd-444e-8152-728ae792d6b1" providerId="ADAL" clId="{8797DDE1-E717-4B82-8CB1-FB8A5736D5DA}" dt="2024-10-23T21:37:58.084" v="866" actId="1076"/>
-          <ac:spMkLst>
-            <pc:docMk/>
-            <pc:sldMk cId="927411034" sldId="257"/>
-            <ac:spMk id="1040" creationId="{C2FA6720-E0AB-3C42-373A-0E7C21BA349B}"/>
-          </ac:spMkLst>
-        </pc:spChg>
-        <pc:spChg chg="add mod">
-          <ac:chgData name="George Hariman" userId="944226f4-c0bd-444e-8152-728ae792d6b1" providerId="ADAL" clId="{8797DDE1-E717-4B82-8CB1-FB8A5736D5DA}" dt="2024-10-23T21:36:03.169" v="862" actId="164"/>
-          <ac:spMkLst>
-            <pc:docMk/>
-            <pc:sldMk cId="927411034" sldId="257"/>
-            <ac:spMk id="1041" creationId="{D308CFE4-04A0-38B2-F73B-51D4D8C906F9}"/>
-          </ac:spMkLst>
-        </pc:spChg>
-        <pc:spChg chg="add mod">
-          <ac:chgData name="George Hariman" userId="944226f4-c0bd-444e-8152-728ae792d6b1" providerId="ADAL" clId="{8797DDE1-E717-4B82-8CB1-FB8A5736D5DA}" dt="2024-10-23T21:36:03.169" v="862" actId="164"/>
-          <ac:spMkLst>
-            <pc:docMk/>
-            <pc:sldMk cId="927411034" sldId="257"/>
-            <ac:spMk id="1047" creationId="{FD5042A2-4A32-CAAB-7A94-F554302A4432}"/>
-          </ac:spMkLst>
-        </pc:spChg>
-        <pc:spChg chg="add mod">
-          <ac:chgData name="George Hariman" userId="944226f4-c0bd-444e-8152-728ae792d6b1" providerId="ADAL" clId="{8797DDE1-E717-4B82-8CB1-FB8A5736D5DA}" dt="2024-10-23T21:36:03.169" v="862" actId="164"/>
-          <ac:spMkLst>
-            <pc:docMk/>
-            <pc:sldMk cId="927411034" sldId="257"/>
-            <ac:spMk id="1048" creationId="{69AD81F5-6010-93BF-5C0F-2D2CF9ED00D3}"/>
-          </ac:spMkLst>
-        </pc:spChg>
-        <pc:spChg chg="add">
-          <ac:chgData name="George Hariman" userId="944226f4-c0bd-444e-8152-728ae792d6b1" providerId="ADAL" clId="{8797DDE1-E717-4B82-8CB1-FB8A5736D5DA}" dt="2024-10-23T21:21:08.862" v="467"/>
-          <ac:spMkLst>
-            <pc:docMk/>
-            <pc:sldMk cId="927411034" sldId="257"/>
-            <ac:spMk id="1050" creationId="{5B862DB3-99B9-B1B6-9D4D-9F5E2050E34E}"/>
-          </ac:spMkLst>
-        </pc:spChg>
-        <pc:spChg chg="add del mod">
-          <ac:chgData name="George Hariman" userId="944226f4-c0bd-444e-8152-728ae792d6b1" providerId="ADAL" clId="{8797DDE1-E717-4B82-8CB1-FB8A5736D5DA}" dt="2024-10-23T21:21:55.485" v="476" actId="478"/>
-          <ac:spMkLst>
-            <pc:docMk/>
-            <pc:sldMk cId="927411034" sldId="257"/>
-            <ac:spMk id="1054" creationId="{69DD0EC3-760E-D717-9AAD-2B539E2C26CA}"/>
-          </ac:spMkLst>
-        </pc:spChg>
-        <pc:spChg chg="add mod">
-          <ac:chgData name="George Hariman" userId="944226f4-c0bd-444e-8152-728ae792d6b1" providerId="ADAL" clId="{8797DDE1-E717-4B82-8CB1-FB8A5736D5DA}" dt="2024-10-23T21:36:03.169" v="862" actId="164"/>
-          <ac:spMkLst>
-            <pc:docMk/>
-            <pc:sldMk cId="927411034" sldId="257"/>
-            <ac:spMk id="1055" creationId="{48873E5A-D1D2-78E5-7521-ADEB34DE988E}"/>
-          </ac:spMkLst>
-        </pc:spChg>
-        <pc:spChg chg="add mod">
-          <ac:chgData name="George Hariman" userId="944226f4-c0bd-444e-8152-728ae792d6b1" providerId="ADAL" clId="{8797DDE1-E717-4B82-8CB1-FB8A5736D5DA}" dt="2024-10-23T21:36:57.682" v="864" actId="1076"/>
-          <ac:spMkLst>
-            <pc:docMk/>
-            <pc:sldMk cId="927411034" sldId="257"/>
-            <ac:spMk id="1057" creationId="{F1135BED-8E99-2DFC-6111-E4C5022E9298}"/>
-          </ac:spMkLst>
-        </pc:spChg>
-        <pc:spChg chg="add mod">
-          <ac:chgData name="George Hariman" userId="944226f4-c0bd-444e-8152-728ae792d6b1" providerId="ADAL" clId="{8797DDE1-E717-4B82-8CB1-FB8A5736D5DA}" dt="2024-10-23T21:36:03.169" v="862" actId="164"/>
-          <ac:spMkLst>
-            <pc:docMk/>
-            <pc:sldMk cId="927411034" sldId="257"/>
-            <ac:spMk id="1060" creationId="{7CFB31E4-92AD-03B6-2FF2-92A9001FDA02}"/>
-          </ac:spMkLst>
-        </pc:spChg>
-        <pc:spChg chg="add mod">
-          <ac:chgData name="George Hariman" userId="944226f4-c0bd-444e-8152-728ae792d6b1" providerId="ADAL" clId="{8797DDE1-E717-4B82-8CB1-FB8A5736D5DA}" dt="2024-10-23T21:36:03.169" v="862" actId="164"/>
-          <ac:spMkLst>
-            <pc:docMk/>
-            <pc:sldMk cId="927411034" sldId="257"/>
-            <ac:spMk id="1061" creationId="{78607C36-AA16-6F38-AC1F-A4E2430F0F41}"/>
-          </ac:spMkLst>
-        </pc:spChg>
-        <pc:spChg chg="add mod">
-          <ac:chgData name="George Hariman" userId="944226f4-c0bd-444e-8152-728ae792d6b1" providerId="ADAL" clId="{8797DDE1-E717-4B82-8CB1-FB8A5736D5DA}" dt="2024-10-23T21:36:03.169" v="862" actId="164"/>
-          <ac:spMkLst>
-            <pc:docMk/>
-            <pc:sldMk cId="927411034" sldId="257"/>
-            <ac:spMk id="1062" creationId="{62BCB61E-B907-C039-7FCA-F272CC51D3BA}"/>
-          </ac:spMkLst>
-        </pc:spChg>
-        <pc:spChg chg="add mod">
-          <ac:chgData name="George Hariman" userId="944226f4-c0bd-444e-8152-728ae792d6b1" providerId="ADAL" clId="{8797DDE1-E717-4B82-8CB1-FB8A5736D5DA}" dt="2024-10-23T21:36:03.169" v="862" actId="164"/>
-          <ac:spMkLst>
-            <pc:docMk/>
-            <pc:sldMk cId="927411034" sldId="257"/>
-            <ac:spMk id="1063" creationId="{986DD84D-1AE7-7F6C-4268-C25DAC8657A1}"/>
-          </ac:spMkLst>
-        </pc:spChg>
-        <pc:spChg chg="add mod">
-          <ac:chgData name="George Hariman" userId="944226f4-c0bd-444e-8152-728ae792d6b1" providerId="ADAL" clId="{8797DDE1-E717-4B82-8CB1-FB8A5736D5DA}" dt="2024-10-23T21:36:03.169" v="862" actId="164"/>
-          <ac:spMkLst>
-            <pc:docMk/>
-            <pc:sldMk cId="927411034" sldId="257"/>
-            <ac:spMk id="1066" creationId="{3A3EE481-27A5-6EAC-6495-9151D17CB900}"/>
-          </ac:spMkLst>
-        </pc:spChg>
-        <pc:spChg chg="add mod">
-          <ac:chgData name="George Hariman" userId="944226f4-c0bd-444e-8152-728ae792d6b1" providerId="ADAL" clId="{8797DDE1-E717-4B82-8CB1-FB8A5736D5DA}" dt="2024-10-23T21:39:17.463" v="882" actId="1076"/>
-          <ac:spMkLst>
-            <pc:docMk/>
-            <pc:sldMk cId="927411034" sldId="257"/>
-            <ac:spMk id="1067" creationId="{24272947-EB14-4914-7863-304FCE6F6CD7}"/>
-          </ac:spMkLst>
-        </pc:spChg>
-        <pc:spChg chg="add mod">
-          <ac:chgData name="George Hariman" userId="944226f4-c0bd-444e-8152-728ae792d6b1" providerId="ADAL" clId="{8797DDE1-E717-4B82-8CB1-FB8A5736D5DA}" dt="2024-10-23T21:37:33.220" v="865" actId="1076"/>
-          <ac:spMkLst>
-            <pc:docMk/>
-            <pc:sldMk cId="927411034" sldId="257"/>
-            <ac:spMk id="1068" creationId="{C94B1C8E-6491-2EC3-2487-0546C1BF23BD}"/>
-          </ac:spMkLst>
-        </pc:spChg>
-        <pc:spChg chg="add mod">
-          <ac:chgData name="George Hariman" userId="944226f4-c0bd-444e-8152-728ae792d6b1" providerId="ADAL" clId="{8797DDE1-E717-4B82-8CB1-FB8A5736D5DA}" dt="2024-10-23T21:36:03.169" v="862" actId="164"/>
-          <ac:spMkLst>
-            <pc:docMk/>
-            <pc:sldMk cId="927411034" sldId="257"/>
-            <ac:spMk id="1084" creationId="{9F93EDEC-7873-12B7-DD54-F9C25E80E0DF}"/>
-          </ac:spMkLst>
-        </pc:spChg>
-        <pc:spChg chg="add mod">
-          <ac:chgData name="George Hariman" userId="944226f4-c0bd-444e-8152-728ae792d6b1" providerId="ADAL" clId="{8797DDE1-E717-4B82-8CB1-FB8A5736D5DA}" dt="2024-10-23T21:36:03.169" v="862" actId="164"/>
-          <ac:spMkLst>
-            <pc:docMk/>
-            <pc:sldMk cId="927411034" sldId="257"/>
-            <ac:spMk id="1086" creationId="{142D2E0D-349F-45FE-9108-D36BA11E216C}"/>
-          </ac:spMkLst>
-        </pc:spChg>
-        <pc:spChg chg="add mod">
-          <ac:chgData name="George Hariman" userId="944226f4-c0bd-444e-8152-728ae792d6b1" providerId="ADAL" clId="{8797DDE1-E717-4B82-8CB1-FB8A5736D5DA}" dt="2024-10-23T21:36:03.169" v="862" actId="164"/>
-          <ac:spMkLst>
-            <pc:docMk/>
-            <pc:sldMk cId="927411034" sldId="257"/>
-            <ac:spMk id="1090" creationId="{76093485-D9E0-EA7E-81F2-5BD87C289984}"/>
-          </ac:spMkLst>
-        </pc:spChg>
-        <pc:spChg chg="add mod">
-          <ac:chgData name="George Hariman" userId="944226f4-c0bd-444e-8152-728ae792d6b1" providerId="ADAL" clId="{8797DDE1-E717-4B82-8CB1-FB8A5736D5DA}" dt="2024-10-23T21:36:03.169" v="862" actId="164"/>
-          <ac:spMkLst>
-            <pc:docMk/>
-            <pc:sldMk cId="927411034" sldId="257"/>
-            <ac:spMk id="1091" creationId="{97631646-10FF-E127-2B5C-223FA2FCF8BC}"/>
-          </ac:spMkLst>
-        </pc:spChg>
-        <pc:spChg chg="add mod">
-          <ac:chgData name="George Hariman" userId="944226f4-c0bd-444e-8152-728ae792d6b1" providerId="ADAL" clId="{8797DDE1-E717-4B82-8CB1-FB8A5736D5DA}" dt="2024-10-23T21:36:03.169" v="862" actId="164"/>
-          <ac:spMkLst>
-            <pc:docMk/>
-            <pc:sldMk cId="927411034" sldId="257"/>
-            <ac:spMk id="1092" creationId="{035B62F3-EB53-207A-08E5-009A7EF74746}"/>
-          </ac:spMkLst>
-        </pc:spChg>
-        <pc:spChg chg="add mod">
-          <ac:chgData name="George Hariman" userId="944226f4-c0bd-444e-8152-728ae792d6b1" providerId="ADAL" clId="{8797DDE1-E717-4B82-8CB1-FB8A5736D5DA}" dt="2024-10-23T21:36:03.169" v="862" actId="164"/>
-          <ac:spMkLst>
-            <pc:docMk/>
-            <pc:sldMk cId="927411034" sldId="257"/>
-            <ac:spMk id="1093" creationId="{10CFD357-A251-37A5-5FAF-6BC143606524}"/>
-          </ac:spMkLst>
-        </pc:spChg>
-        <pc:spChg chg="add mod">
-          <ac:chgData name="George Hariman" userId="944226f4-c0bd-444e-8152-728ae792d6b1" providerId="ADAL" clId="{8797DDE1-E717-4B82-8CB1-FB8A5736D5DA}" dt="2024-10-23T21:36:03.169" v="862" actId="164"/>
-          <ac:spMkLst>
-            <pc:docMk/>
-            <pc:sldMk cId="927411034" sldId="257"/>
-            <ac:spMk id="1094" creationId="{D0A6565E-9B42-5670-7859-49782F9D9B37}"/>
-          </ac:spMkLst>
-        </pc:spChg>
-        <pc:spChg chg="add mod">
-          <ac:chgData name="George Hariman" userId="944226f4-c0bd-444e-8152-728ae792d6b1" providerId="ADAL" clId="{8797DDE1-E717-4B82-8CB1-FB8A5736D5DA}" dt="2024-10-23T21:39:51.795" v="900" actId="207"/>
-          <ac:spMkLst>
-            <pc:docMk/>
-            <pc:sldMk cId="927411034" sldId="257"/>
-            <ac:spMk id="1105" creationId="{295313DA-654E-0A22-9168-013EF1C650AF}"/>
-          </ac:spMkLst>
-        </pc:spChg>
-        <pc:grpChg chg="add mod">
-          <ac:chgData name="George Hariman" userId="944226f4-c0bd-444e-8152-728ae792d6b1" providerId="ADAL" clId="{8797DDE1-E717-4B82-8CB1-FB8A5736D5DA}" dt="2024-10-23T21:36:03.169" v="862" actId="164"/>
-          <ac:grpSpMkLst>
-            <pc:docMk/>
-            <pc:sldMk cId="927411034" sldId="257"/>
-            <ac:grpSpMk id="1095" creationId="{B1C3C2A1-190B-895F-F1B4-B218C7ACAE46}"/>
-          </ac:grpSpMkLst>
-        </pc:grpChg>
-        <pc:picChg chg="add del mod ord">
-          <ac:chgData name="George Hariman" userId="944226f4-c0bd-444e-8152-728ae792d6b1" providerId="ADAL" clId="{8797DDE1-E717-4B82-8CB1-FB8A5736D5DA}" dt="2024-10-23T21:30:32.983" v="678" actId="478"/>
-          <ac:picMkLst>
-            <pc:docMk/>
-            <pc:sldMk cId="927411034" sldId="257"/>
-            <ac:picMk id="4" creationId="{63056783-D22E-A633-0AF4-90D3F3971902}"/>
-          </ac:picMkLst>
-        </pc:picChg>
-        <pc:picChg chg="add mod">
-          <ac:chgData name="George Hariman" userId="944226f4-c0bd-444e-8152-728ae792d6b1" providerId="ADAL" clId="{8797DDE1-E717-4B82-8CB1-FB8A5736D5DA}" dt="2024-10-23T21:36:03.169" v="862" actId="164"/>
-          <ac:picMkLst>
-            <pc:docMk/>
-            <pc:sldMk cId="927411034" sldId="257"/>
-            <ac:picMk id="1026" creationId="{F7B1EDF7-AAF5-B7CF-960A-6503C1863859}"/>
-          </ac:picMkLst>
-        </pc:picChg>
-        <pc:picChg chg="add mod">
-          <ac:chgData name="George Hariman" userId="944226f4-c0bd-444e-8152-728ae792d6b1" providerId="ADAL" clId="{8797DDE1-E717-4B82-8CB1-FB8A5736D5DA}" dt="2024-10-23T21:36:03.169" v="862" actId="164"/>
-          <ac:picMkLst>
-            <pc:docMk/>
-            <pc:sldMk cId="927411034" sldId="257"/>
-            <ac:picMk id="1028" creationId="{6E9CEC33-8CA7-E5F1-C383-13328B869304}"/>
-          </ac:picMkLst>
-        </pc:picChg>
-        <pc:picChg chg="add mod">
-          <ac:chgData name="George Hariman" userId="944226f4-c0bd-444e-8152-728ae792d6b1" providerId="ADAL" clId="{8797DDE1-E717-4B82-8CB1-FB8A5736D5DA}" dt="2024-10-23T21:36:03.169" v="862" actId="164"/>
-          <ac:picMkLst>
-            <pc:docMk/>
-            <pc:sldMk cId="927411034" sldId="257"/>
-            <ac:picMk id="1051" creationId="{862055BF-0603-49CD-0CC0-099B921004D0}"/>
-          </ac:picMkLst>
-        </pc:picChg>
-        <pc:picChg chg="add mod">
-          <ac:chgData name="George Hariman" userId="944226f4-c0bd-444e-8152-728ae792d6b1" providerId="ADAL" clId="{8797DDE1-E717-4B82-8CB1-FB8A5736D5DA}" dt="2024-10-23T21:36:03.169" v="862" actId="164"/>
-          <ac:picMkLst>
-            <pc:docMk/>
-            <pc:sldMk cId="927411034" sldId="257"/>
-            <ac:picMk id="1059" creationId="{650DACB8-8C79-AC02-98CD-9DF3AE95FDBA}"/>
-          </ac:picMkLst>
-        </pc:picChg>
-        <pc:picChg chg="add mod">
-          <ac:chgData name="George Hariman" userId="944226f4-c0bd-444e-8152-728ae792d6b1" providerId="ADAL" clId="{8797DDE1-E717-4B82-8CB1-FB8A5736D5DA}" dt="2024-10-23T21:36:03.169" v="862" actId="164"/>
-          <ac:picMkLst>
-            <pc:docMk/>
-            <pc:sldMk cId="927411034" sldId="257"/>
-            <ac:picMk id="1085" creationId="{8EADC3D2-CEC5-158A-7F74-681E819486DF}"/>
-          </ac:picMkLst>
-        </pc:picChg>
-        <pc:cxnChg chg="add mod">
-          <ac:chgData name="George Hariman" userId="944226f4-c0bd-444e-8152-728ae792d6b1" providerId="ADAL" clId="{8797DDE1-E717-4B82-8CB1-FB8A5736D5DA}" dt="2024-10-23T21:36:03.169" v="862" actId="164"/>
-          <ac:cxnSpMkLst>
-            <pc:docMk/>
-            <pc:sldMk cId="927411034" sldId="257"/>
-            <ac:cxnSpMk id="6" creationId="{12D47944-4813-9B60-9CEF-461026621428}"/>
-          </ac:cxnSpMkLst>
-        </pc:cxnChg>
-        <pc:cxnChg chg="add mod">
-          <ac:chgData name="George Hariman" userId="944226f4-c0bd-444e-8152-728ae792d6b1" providerId="ADAL" clId="{8797DDE1-E717-4B82-8CB1-FB8A5736D5DA}" dt="2024-10-23T21:36:03.169" v="862" actId="164"/>
-          <ac:cxnSpMkLst>
-            <pc:docMk/>
-            <pc:sldMk cId="927411034" sldId="257"/>
-            <ac:cxnSpMk id="7" creationId="{DAFCB135-DDFD-7B55-FB93-5D4EA4D805F7}"/>
-          </ac:cxnSpMkLst>
-        </pc:cxnChg>
-        <pc:cxnChg chg="add del mod">
-          <ac:chgData name="George Hariman" userId="944226f4-c0bd-444e-8152-728ae792d6b1" providerId="ADAL" clId="{8797DDE1-E717-4B82-8CB1-FB8A5736D5DA}" dt="2024-10-23T21:11:23.859" v="89" actId="478"/>
-          <ac:cxnSpMkLst>
-            <pc:docMk/>
-            <pc:sldMk cId="927411034" sldId="257"/>
-            <ac:cxnSpMk id="8" creationId="{8E1ED2BE-27A8-E642-0253-5477E63DCD93}"/>
-          </ac:cxnSpMkLst>
-        </pc:cxnChg>
-        <pc:cxnChg chg="add del mod">
-          <ac:chgData name="George Hariman" userId="944226f4-c0bd-444e-8152-728ae792d6b1" providerId="ADAL" clId="{8797DDE1-E717-4B82-8CB1-FB8A5736D5DA}" dt="2024-10-23T21:11:24.961" v="90" actId="478"/>
-          <ac:cxnSpMkLst>
-            <pc:docMk/>
-            <pc:sldMk cId="927411034" sldId="257"/>
-            <ac:cxnSpMk id="10" creationId="{725668BB-6BBE-E06B-8C44-FEE8FF47F47D}"/>
-          </ac:cxnSpMkLst>
-        </pc:cxnChg>
-        <pc:cxnChg chg="add mod">
-          <ac:chgData name="George Hariman" userId="944226f4-c0bd-444e-8152-728ae792d6b1" providerId="ADAL" clId="{8797DDE1-E717-4B82-8CB1-FB8A5736D5DA}" dt="2024-10-23T21:38:23.895" v="873" actId="1076"/>
-          <ac:cxnSpMkLst>
-            <pc:docMk/>
-            <pc:sldMk cId="927411034" sldId="257"/>
-            <ac:cxnSpMk id="17" creationId="{1C05B4DF-8164-1AA2-455E-3F857B10C181}"/>
-          </ac:cxnSpMkLst>
-        </pc:cxnChg>
-        <pc:cxnChg chg="add mod">
-          <ac:chgData name="George Hariman" userId="944226f4-c0bd-444e-8152-728ae792d6b1" providerId="ADAL" clId="{8797DDE1-E717-4B82-8CB1-FB8A5736D5DA}" dt="2024-10-23T21:38:08.678" v="868" actId="1076"/>
-          <ac:cxnSpMkLst>
-            <pc:docMk/>
-            <pc:sldMk cId="927411034" sldId="257"/>
-            <ac:cxnSpMk id="26" creationId="{F38B1FCF-894C-6420-76C6-ACAE83233D0D}"/>
-          </ac:cxnSpMkLst>
-        </pc:cxnChg>
-        <pc:cxnChg chg="add mod">
-          <ac:chgData name="George Hariman" userId="944226f4-c0bd-444e-8152-728ae792d6b1" providerId="ADAL" clId="{8797DDE1-E717-4B82-8CB1-FB8A5736D5DA}" dt="2024-10-23T21:36:03.169" v="862" actId="164"/>
-          <ac:cxnSpMkLst>
-            <pc:docMk/>
-            <pc:sldMk cId="927411034" sldId="257"/>
-            <ac:cxnSpMk id="29" creationId="{6DC7EFDB-7147-7BB1-F6C5-A5918DD0202C}"/>
-          </ac:cxnSpMkLst>
-        </pc:cxnChg>
-        <pc:cxnChg chg="add del mod">
-          <ac:chgData name="George Hariman" userId="944226f4-c0bd-444e-8152-728ae792d6b1" providerId="ADAL" clId="{8797DDE1-E717-4B82-8CB1-FB8A5736D5DA}" dt="2024-10-23T21:16:16.958" v="180" actId="478"/>
-          <ac:cxnSpMkLst>
-            <pc:docMk/>
-            <pc:sldMk cId="927411034" sldId="257"/>
-            <ac:cxnSpMk id="31" creationId="{E310C452-1CDA-E1B0-21D2-3598101D66CF}"/>
-          </ac:cxnSpMkLst>
-        </pc:cxnChg>
-        <pc:cxnChg chg="add mod">
-          <ac:chgData name="George Hariman" userId="944226f4-c0bd-444e-8152-728ae792d6b1" providerId="ADAL" clId="{8797DDE1-E717-4B82-8CB1-FB8A5736D5DA}" dt="2024-10-23T21:36:03.169" v="862" actId="164"/>
-          <ac:cxnSpMkLst>
-            <pc:docMk/>
-            <pc:sldMk cId="927411034" sldId="257"/>
-            <ac:cxnSpMk id="1025" creationId="{8FA12E89-0D2A-72C8-11B6-AFE566315FCD}"/>
-          </ac:cxnSpMkLst>
-        </pc:cxnChg>
-        <pc:cxnChg chg="add del">
-          <ac:chgData name="George Hariman" userId="944226f4-c0bd-444e-8152-728ae792d6b1" providerId="ADAL" clId="{8797DDE1-E717-4B82-8CB1-FB8A5736D5DA}" dt="2024-10-23T21:14:41.457" v="135" actId="11529"/>
-          <ac:cxnSpMkLst>
-            <pc:docMk/>
-            <pc:sldMk cId="927411034" sldId="257"/>
-            <ac:cxnSpMk id="1031" creationId="{C082CD9C-FD09-1338-6365-D8EC5CD771CD}"/>
-          </ac:cxnSpMkLst>
-        </pc:cxnChg>
-        <pc:cxnChg chg="add mod">
-          <ac:chgData name="George Hariman" userId="944226f4-c0bd-444e-8152-728ae792d6b1" providerId="ADAL" clId="{8797DDE1-E717-4B82-8CB1-FB8A5736D5DA}" dt="2024-10-23T21:36:03.169" v="862" actId="164"/>
-          <ac:cxnSpMkLst>
-            <pc:docMk/>
-            <pc:sldMk cId="927411034" sldId="257"/>
-            <ac:cxnSpMk id="1033" creationId="{528CF66E-AD38-E2D2-AF7F-9E4AB92A9C27}"/>
-          </ac:cxnSpMkLst>
-        </pc:cxnChg>
-        <pc:cxnChg chg="add mod">
-          <ac:chgData name="George Hariman" userId="944226f4-c0bd-444e-8152-728ae792d6b1" providerId="ADAL" clId="{8797DDE1-E717-4B82-8CB1-FB8A5736D5DA}" dt="2024-10-23T21:36:03.169" v="862" actId="164"/>
-          <ac:cxnSpMkLst>
-            <pc:docMk/>
-            <pc:sldMk cId="927411034" sldId="257"/>
-            <ac:cxnSpMk id="1035" creationId="{6D58D9A1-69A0-A081-4A73-F1C6907C87A4}"/>
-          </ac:cxnSpMkLst>
-        </pc:cxnChg>
-        <pc:cxnChg chg="add mod">
-          <ac:chgData name="George Hariman" userId="944226f4-c0bd-444e-8152-728ae792d6b1" providerId="ADAL" clId="{8797DDE1-E717-4B82-8CB1-FB8A5736D5DA}" dt="2024-10-23T21:36:03.169" v="862" actId="164"/>
-          <ac:cxnSpMkLst>
-            <pc:docMk/>
-            <pc:sldMk cId="927411034" sldId="257"/>
-            <ac:cxnSpMk id="1042" creationId="{E7641C78-82B1-AE3E-8C75-F788598D4934}"/>
-          </ac:cxnSpMkLst>
-        </pc:cxnChg>
-        <pc:cxnChg chg="add mod">
-          <ac:chgData name="George Hariman" userId="944226f4-c0bd-444e-8152-728ae792d6b1" providerId="ADAL" clId="{8797DDE1-E717-4B82-8CB1-FB8A5736D5DA}" dt="2024-10-23T21:36:03.169" v="862" actId="164"/>
-          <ac:cxnSpMkLst>
-            <pc:docMk/>
-            <pc:sldMk cId="927411034" sldId="257"/>
-            <ac:cxnSpMk id="1044" creationId="{AC8017CD-1E1D-4453-1B5E-7153B548CC69}"/>
-          </ac:cxnSpMkLst>
-        </pc:cxnChg>
-        <pc:cxnChg chg="add mod">
-          <ac:chgData name="George Hariman" userId="944226f4-c0bd-444e-8152-728ae792d6b1" providerId="ADAL" clId="{8797DDE1-E717-4B82-8CB1-FB8A5736D5DA}" dt="2024-10-23T21:36:55.033" v="863" actId="1076"/>
-          <ac:cxnSpMkLst>
-            <pc:docMk/>
-            <pc:sldMk cId="927411034" sldId="257"/>
-            <ac:cxnSpMk id="1052" creationId="{C6262A8B-F746-5142-91F6-5FA1DE9C2634}"/>
-          </ac:cxnSpMkLst>
-        </pc:cxnChg>
-        <pc:cxnChg chg="add del mod">
-          <ac:chgData name="George Hariman" userId="944226f4-c0bd-444e-8152-728ae792d6b1" providerId="ADAL" clId="{8797DDE1-E717-4B82-8CB1-FB8A5736D5DA}" dt="2024-10-23T21:26:34.116" v="576" actId="478"/>
-          <ac:cxnSpMkLst>
-            <pc:docMk/>
-            <pc:sldMk cId="927411034" sldId="257"/>
-            <ac:cxnSpMk id="1056" creationId="{85B70D1C-0EC9-8872-B96C-F665545100C9}"/>
-          </ac:cxnSpMkLst>
-        </pc:cxnChg>
-        <pc:cxnChg chg="add mod">
-          <ac:chgData name="George Hariman" userId="944226f4-c0bd-444e-8152-728ae792d6b1" providerId="ADAL" clId="{8797DDE1-E717-4B82-8CB1-FB8A5736D5DA}" dt="2024-10-23T21:39:14.920" v="881" actId="1076"/>
-          <ac:cxnSpMkLst>
-            <pc:docMk/>
-            <pc:sldMk cId="927411034" sldId="257"/>
-            <ac:cxnSpMk id="1064" creationId="{7A89C6B0-8058-75FB-4825-2FE89B524BEF}"/>
-          </ac:cxnSpMkLst>
-        </pc:cxnChg>
-        <pc:cxnChg chg="add del mod">
-          <ac:chgData name="George Hariman" userId="944226f4-c0bd-444e-8152-728ae792d6b1" providerId="ADAL" clId="{8797DDE1-E717-4B82-8CB1-FB8A5736D5DA}" dt="2024-10-23T21:27:37.105" v="622" actId="478"/>
-          <ac:cxnSpMkLst>
-            <pc:docMk/>
-            <pc:sldMk cId="927411034" sldId="257"/>
-            <ac:cxnSpMk id="1070" creationId="{E65EED2E-F712-07AD-B048-3A95022CA7AC}"/>
-          </ac:cxnSpMkLst>
-        </pc:cxnChg>
-        <pc:cxnChg chg="add mod">
-          <ac:chgData name="George Hariman" userId="944226f4-c0bd-444e-8152-728ae792d6b1" providerId="ADAL" clId="{8797DDE1-E717-4B82-8CB1-FB8A5736D5DA}" dt="2024-10-23T21:39:13.369" v="880" actId="14100"/>
-          <ac:cxnSpMkLst>
-            <pc:docMk/>
-            <pc:sldMk cId="927411034" sldId="257"/>
-            <ac:cxnSpMk id="1072" creationId="{1D8CC8DE-8C5D-11EA-99D3-55F7BD456199}"/>
-          </ac:cxnSpMkLst>
-        </pc:cxnChg>
-        <pc:cxnChg chg="add mod">
-          <ac:chgData name="George Hariman" userId="944226f4-c0bd-444e-8152-728ae792d6b1" providerId="ADAL" clId="{8797DDE1-E717-4B82-8CB1-FB8A5736D5DA}" dt="2024-10-23T21:39:03.796" v="878" actId="14100"/>
-          <ac:cxnSpMkLst>
-            <pc:docMk/>
-            <pc:sldMk cId="927411034" sldId="257"/>
-            <ac:cxnSpMk id="1074" creationId="{70A57AC9-D117-CE50-41D4-4396BCF479F2}"/>
-          </ac:cxnSpMkLst>
-        </pc:cxnChg>
-        <pc:cxnChg chg="add del mod">
-          <ac:chgData name="George Hariman" userId="944226f4-c0bd-444e-8152-728ae792d6b1" providerId="ADAL" clId="{8797DDE1-E717-4B82-8CB1-FB8A5736D5DA}" dt="2024-10-23T21:34:27.234" v="706" actId="478"/>
-          <ac:cxnSpMkLst>
-            <pc:docMk/>
-            <pc:sldMk cId="927411034" sldId="257"/>
-            <ac:cxnSpMk id="1088" creationId="{73EF62E5-BC08-BE22-12F0-CA2622CFC678}"/>
-          </ac:cxnSpMkLst>
-        </pc:cxnChg>
       </pc:sldChg>
       <pc:sldMasterChg chg="delSldLayout">
         <pc:chgData name="George Hariman" userId="944226f4-c0bd-444e-8152-728ae792d6b1" providerId="ADAL" clId="{8797DDE1-E717-4B82-8CB1-FB8A5736D5DA}" dt="2024-10-23T21:19:39.284" v="406" actId="47"/>
@@ -631,12 +175,36 @@
           <pc:docMk/>
           <pc:sldMk cId="927411034" sldId="257"/>
         </pc:sldMkLst>
-        <pc:spChg chg="mod">
-          <ac:chgData name="George Hariman" userId="944226f4-c0bd-444e-8152-728ae792d6b1" providerId="ADAL" clId="{5C80B29B-2D49-4B02-BFA7-57ACAB083A0E}" dt="2024-10-28T22:39:26.207" v="19" actId="1076"/>
+      </pc:sldChg>
+    </pc:docChg>
+  </pc:docChgLst>
+  <pc:docChgLst>
+    <pc:chgData name="George Hariman" userId="944226f4-c0bd-444e-8152-728ae792d6b1" providerId="ADAL" clId="{FD4EFFFC-F49C-43EB-A90A-FC442D6D255B}"/>
+    <pc:docChg chg="modSld">
+      <pc:chgData name="George Hariman" userId="944226f4-c0bd-444e-8152-728ae792d6b1" providerId="ADAL" clId="{FD4EFFFC-F49C-43EB-A90A-FC442D6D255B}" dt="2025-02-19T22:03:11.363" v="134" actId="1076"/>
+      <pc:docMkLst>
+        <pc:docMk/>
+      </pc:docMkLst>
+      <pc:sldChg chg="addSp modSp mod">
+        <pc:chgData name="George Hariman" userId="944226f4-c0bd-444e-8152-728ae792d6b1" providerId="ADAL" clId="{FD4EFFFC-F49C-43EB-A90A-FC442D6D255B}" dt="2025-02-19T22:03:11.363" v="134" actId="1076"/>
+        <pc:sldMkLst>
+          <pc:docMk/>
+          <pc:sldMk cId="927411034" sldId="257"/>
+        </pc:sldMkLst>
+        <pc:spChg chg="add mod">
+          <ac:chgData name="George Hariman" userId="944226f4-c0bd-444e-8152-728ae792d6b1" providerId="ADAL" clId="{FD4EFFFC-F49C-43EB-A90A-FC442D6D255B}" dt="2025-02-19T22:03:11.363" v="134" actId="1076"/>
           <ac:spMkLst>
             <pc:docMk/>
             <pc:sldMk cId="927411034" sldId="257"/>
-            <ac:spMk id="1048" creationId="{69AD81F5-6010-93BF-5C0F-2D2CF9ED00D3}"/>
+            <ac:spMk id="3" creationId="{92270134-3C78-86EA-38D4-40F961DC282A}"/>
+          </ac:spMkLst>
+        </pc:spChg>
+        <pc:spChg chg="mod">
+          <ac:chgData name="George Hariman" userId="944226f4-c0bd-444e-8152-728ae792d6b1" providerId="ADAL" clId="{FD4EFFFC-F49C-43EB-A90A-FC442D6D255B}" dt="2025-02-19T21:59:06.979" v="7" actId="20577"/>
+          <ac:spMkLst>
+            <pc:docMk/>
+            <pc:sldMk cId="927411034" sldId="257"/>
+            <ac:spMk id="1086" creationId="{142D2E0D-349F-45FE-9108-D36BA11E216C}"/>
           </ac:spMkLst>
         </pc:spChg>
       </pc:sldChg>
@@ -1007,14 +575,6 @@
           <pc:docMk/>
           <pc:sldMk cId="927411034" sldId="257"/>
         </pc:sldMkLst>
-        <pc:spChg chg="mod">
-          <ac:chgData name="George Hariman" userId="944226f4-c0bd-444e-8152-728ae792d6b1" providerId="ADAL" clId="{6C466113-2838-427E-8A44-C4C1CDF4564F}" dt="2024-10-31T17:53:33.633" v="44" actId="20577"/>
-          <ac:spMkLst>
-            <pc:docMk/>
-            <pc:sldMk cId="927411034" sldId="257"/>
-            <ac:spMk id="2" creationId="{F4E32AA9-1618-F765-B95C-C3A8EB9C18DF}"/>
-          </ac:spMkLst>
-        </pc:spChg>
       </pc:sldChg>
       <pc:sldChg chg="modSp new del mod">
         <pc:chgData name="George Hariman" userId="944226f4-c0bd-444e-8152-728ae792d6b1" providerId="ADAL" clId="{6C466113-2838-427E-8A44-C4C1CDF4564F}" dt="2024-10-31T17:53:37.304" v="45" actId="47"/>
@@ -1022,14 +582,6 @@
           <pc:docMk/>
           <pc:sldMk cId="1680603285" sldId="258"/>
         </pc:sldMkLst>
-        <pc:spChg chg="mod">
-          <ac:chgData name="George Hariman" userId="944226f4-c0bd-444e-8152-728ae792d6b1" providerId="ADAL" clId="{6C466113-2838-427E-8A44-C4C1CDF4564F}" dt="2024-10-31T17:53:15.628" v="27" actId="20577"/>
-          <ac:spMkLst>
-            <pc:docMk/>
-            <pc:sldMk cId="1680603285" sldId="258"/>
-            <ac:spMk id="2" creationId="{D8C03EA4-96A2-626B-7EB2-E64D130DA1F3}"/>
-          </ac:spMkLst>
-        </pc:spChg>
       </pc:sldChg>
       <pc:sldChg chg="addSp delSp modSp add mod ord">
         <pc:chgData name="George Hariman" userId="944226f4-c0bd-444e-8152-728ae792d6b1" providerId="ADAL" clId="{6C466113-2838-427E-8A44-C4C1CDF4564F}" dt="2024-10-31T18:10:34.772" v="727" actId="20577"/>
@@ -1037,422 +589,6 @@
           <pc:docMk/>
           <pc:sldMk cId="1741448281" sldId="258"/>
         </pc:sldMkLst>
-        <pc:spChg chg="mod">
-          <ac:chgData name="George Hariman" userId="944226f4-c0bd-444e-8152-728ae792d6b1" providerId="ADAL" clId="{6C466113-2838-427E-8A44-C4C1CDF4564F}" dt="2024-10-31T17:53:46.945" v="61" actId="20577"/>
-          <ac:spMkLst>
-            <pc:docMk/>
-            <pc:sldMk cId="1741448281" sldId="258"/>
-            <ac:spMk id="2" creationId="{2A96C716-CEF5-C6DE-E65F-272863D3CB24}"/>
-          </ac:spMkLst>
-        </pc:spChg>
-        <pc:spChg chg="add del mod">
-          <ac:chgData name="George Hariman" userId="944226f4-c0bd-444e-8152-728ae792d6b1" providerId="ADAL" clId="{6C466113-2838-427E-8A44-C4C1CDF4564F}" dt="2024-10-31T17:58:48.911" v="88"/>
-          <ac:spMkLst>
-            <pc:docMk/>
-            <pc:sldMk cId="1741448281" sldId="258"/>
-            <ac:spMk id="9" creationId="{7F6D1FE3-F106-9F68-1028-A855B0633B07}"/>
-          </ac:spMkLst>
-        </pc:spChg>
-        <pc:spChg chg="del mod topLvl">
-          <ac:chgData name="George Hariman" userId="944226f4-c0bd-444e-8152-728ae792d6b1" providerId="ADAL" clId="{6C466113-2838-427E-8A44-C4C1CDF4564F}" dt="2024-10-31T17:57:22.515" v="72" actId="478"/>
-          <ac:spMkLst>
-            <pc:docMk/>
-            <pc:sldMk cId="1741448281" sldId="258"/>
-            <ac:spMk id="12" creationId="{2532828F-CBD8-A564-B9FA-5F5E46A7B802}"/>
-          </ac:spMkLst>
-        </pc:spChg>
-        <pc:spChg chg="add mod">
-          <ac:chgData name="George Hariman" userId="944226f4-c0bd-444e-8152-728ae792d6b1" providerId="ADAL" clId="{6C466113-2838-427E-8A44-C4C1CDF4564F}" dt="2024-10-31T18:08:40.111" v="703" actId="164"/>
-          <ac:spMkLst>
-            <pc:docMk/>
-            <pc:sldMk cId="1741448281" sldId="258"/>
-            <ac:spMk id="13" creationId="{30B00672-88EC-9FF8-112E-CD79A46CE0CA}"/>
-          </ac:spMkLst>
-        </pc:spChg>
-        <pc:spChg chg="add mod">
-          <ac:chgData name="George Hariman" userId="944226f4-c0bd-444e-8152-728ae792d6b1" providerId="ADAL" clId="{6C466113-2838-427E-8A44-C4C1CDF4564F}" dt="2024-10-31T18:08:40.111" v="703" actId="164"/>
-          <ac:spMkLst>
-            <pc:docMk/>
-            <pc:sldMk cId="1741448281" sldId="258"/>
-            <ac:spMk id="14" creationId="{20A29498-52D2-E73E-A30A-CE757DE6584C}"/>
-          </ac:spMkLst>
-        </pc:spChg>
-        <pc:spChg chg="del mod topLvl">
-          <ac:chgData name="George Hariman" userId="944226f4-c0bd-444e-8152-728ae792d6b1" providerId="ADAL" clId="{6C466113-2838-427E-8A44-C4C1CDF4564F}" dt="2024-10-31T17:57:22.515" v="72" actId="478"/>
-          <ac:spMkLst>
-            <pc:docMk/>
-            <pc:sldMk cId="1741448281" sldId="258"/>
-            <ac:spMk id="24" creationId="{AD0720A2-A98C-1314-B4CC-D7D60BBCA490}"/>
-          </ac:spMkLst>
-        </pc:spChg>
-        <pc:spChg chg="del mod topLvl">
-          <ac:chgData name="George Hariman" userId="944226f4-c0bd-444e-8152-728ae792d6b1" providerId="ADAL" clId="{6C466113-2838-427E-8A44-C4C1CDF4564F}" dt="2024-10-31T17:57:22.515" v="72" actId="478"/>
-          <ac:spMkLst>
-            <pc:docMk/>
-            <pc:sldMk cId="1741448281" sldId="258"/>
-            <ac:spMk id="1040" creationId="{99025EBA-117B-4C2C-CAEE-4D6A28F1BAFD}"/>
-          </ac:spMkLst>
-        </pc:spChg>
-        <pc:spChg chg="del mod topLvl">
-          <ac:chgData name="George Hariman" userId="944226f4-c0bd-444e-8152-728ae792d6b1" providerId="ADAL" clId="{6C466113-2838-427E-8A44-C4C1CDF4564F}" dt="2024-10-31T17:57:22.515" v="72" actId="478"/>
-          <ac:spMkLst>
-            <pc:docMk/>
-            <pc:sldMk cId="1741448281" sldId="258"/>
-            <ac:spMk id="1041" creationId="{2E2C8949-77D7-E63D-960D-956937E4C824}"/>
-          </ac:spMkLst>
-        </pc:spChg>
-        <pc:spChg chg="del mod topLvl">
-          <ac:chgData name="George Hariman" userId="944226f4-c0bd-444e-8152-728ae792d6b1" providerId="ADAL" clId="{6C466113-2838-427E-8A44-C4C1CDF4564F}" dt="2024-10-31T17:57:22.515" v="72" actId="478"/>
-          <ac:spMkLst>
-            <pc:docMk/>
-            <pc:sldMk cId="1741448281" sldId="258"/>
-            <ac:spMk id="1047" creationId="{6BE7A91C-77F8-BBC8-84D8-B5A94DEF9A4E}"/>
-          </ac:spMkLst>
-        </pc:spChg>
-        <pc:spChg chg="del mod topLvl">
-          <ac:chgData name="George Hariman" userId="944226f4-c0bd-444e-8152-728ae792d6b1" providerId="ADAL" clId="{6C466113-2838-427E-8A44-C4C1CDF4564F}" dt="2024-10-31T17:57:22.515" v="72" actId="478"/>
-          <ac:spMkLst>
-            <pc:docMk/>
-            <pc:sldMk cId="1741448281" sldId="258"/>
-            <ac:spMk id="1048" creationId="{E6B2FF6F-0781-0AFE-54A6-18E876225087}"/>
-          </ac:spMkLst>
-        </pc:spChg>
-        <pc:spChg chg="del mod topLvl">
-          <ac:chgData name="George Hariman" userId="944226f4-c0bd-444e-8152-728ae792d6b1" providerId="ADAL" clId="{6C466113-2838-427E-8A44-C4C1CDF4564F}" dt="2024-10-31T17:57:22.515" v="72" actId="478"/>
-          <ac:spMkLst>
-            <pc:docMk/>
-            <pc:sldMk cId="1741448281" sldId="258"/>
-            <ac:spMk id="1055" creationId="{DFE5C3C2-D550-4979-3194-2482E10FDD2F}"/>
-          </ac:spMkLst>
-        </pc:spChg>
-        <pc:spChg chg="del mod topLvl">
-          <ac:chgData name="George Hariman" userId="944226f4-c0bd-444e-8152-728ae792d6b1" providerId="ADAL" clId="{6C466113-2838-427E-8A44-C4C1CDF4564F}" dt="2024-10-31T17:57:22.515" v="72" actId="478"/>
-          <ac:spMkLst>
-            <pc:docMk/>
-            <pc:sldMk cId="1741448281" sldId="258"/>
-            <ac:spMk id="1057" creationId="{F3D68354-11A1-49AC-F1EE-2524687C94D9}"/>
-          </ac:spMkLst>
-        </pc:spChg>
-        <pc:spChg chg="del mod topLvl">
-          <ac:chgData name="George Hariman" userId="944226f4-c0bd-444e-8152-728ae792d6b1" providerId="ADAL" clId="{6C466113-2838-427E-8A44-C4C1CDF4564F}" dt="2024-10-31T17:57:22.515" v="72" actId="478"/>
-          <ac:spMkLst>
-            <pc:docMk/>
-            <pc:sldMk cId="1741448281" sldId="258"/>
-            <ac:spMk id="1060" creationId="{D60FB730-7F4F-FD86-3477-D21F965A1A21}"/>
-          </ac:spMkLst>
-        </pc:spChg>
-        <pc:spChg chg="del mod topLvl">
-          <ac:chgData name="George Hariman" userId="944226f4-c0bd-444e-8152-728ae792d6b1" providerId="ADAL" clId="{6C466113-2838-427E-8A44-C4C1CDF4564F}" dt="2024-10-31T17:57:22.515" v="72" actId="478"/>
-          <ac:spMkLst>
-            <pc:docMk/>
-            <pc:sldMk cId="1741448281" sldId="258"/>
-            <ac:spMk id="1061" creationId="{96DB1E8D-F4AD-6CB7-641C-5FC00250532A}"/>
-          </ac:spMkLst>
-        </pc:spChg>
-        <pc:spChg chg="del mod topLvl">
-          <ac:chgData name="George Hariman" userId="944226f4-c0bd-444e-8152-728ae792d6b1" providerId="ADAL" clId="{6C466113-2838-427E-8A44-C4C1CDF4564F}" dt="2024-10-31T17:57:22.515" v="72" actId="478"/>
-          <ac:spMkLst>
-            <pc:docMk/>
-            <pc:sldMk cId="1741448281" sldId="258"/>
-            <ac:spMk id="1062" creationId="{053F11AE-F0E0-E09B-F953-01C9C0BC3802}"/>
-          </ac:spMkLst>
-        </pc:spChg>
-        <pc:spChg chg="del mod topLvl">
-          <ac:chgData name="George Hariman" userId="944226f4-c0bd-444e-8152-728ae792d6b1" providerId="ADAL" clId="{6C466113-2838-427E-8A44-C4C1CDF4564F}" dt="2024-10-31T17:57:22.515" v="72" actId="478"/>
-          <ac:spMkLst>
-            <pc:docMk/>
-            <pc:sldMk cId="1741448281" sldId="258"/>
-            <ac:spMk id="1063" creationId="{0CCA3862-7CC8-4EB9-2525-2E23C8B77796}"/>
-          </ac:spMkLst>
-        </pc:spChg>
-        <pc:spChg chg="del mod topLvl">
-          <ac:chgData name="George Hariman" userId="944226f4-c0bd-444e-8152-728ae792d6b1" providerId="ADAL" clId="{6C466113-2838-427E-8A44-C4C1CDF4564F}" dt="2024-10-31T17:57:22.515" v="72" actId="478"/>
-          <ac:spMkLst>
-            <pc:docMk/>
-            <pc:sldMk cId="1741448281" sldId="258"/>
-            <ac:spMk id="1066" creationId="{408D5DB4-4052-59FF-0E7D-E50009ECDA56}"/>
-          </ac:spMkLst>
-        </pc:spChg>
-        <pc:spChg chg="del mod topLvl">
-          <ac:chgData name="George Hariman" userId="944226f4-c0bd-444e-8152-728ae792d6b1" providerId="ADAL" clId="{6C466113-2838-427E-8A44-C4C1CDF4564F}" dt="2024-10-31T17:57:22.515" v="72" actId="478"/>
-          <ac:spMkLst>
-            <pc:docMk/>
-            <pc:sldMk cId="1741448281" sldId="258"/>
-            <ac:spMk id="1067" creationId="{36F0C999-F0A3-3309-715A-42CBB2D48055}"/>
-          </ac:spMkLst>
-        </pc:spChg>
-        <pc:spChg chg="del mod topLvl">
-          <ac:chgData name="George Hariman" userId="944226f4-c0bd-444e-8152-728ae792d6b1" providerId="ADAL" clId="{6C466113-2838-427E-8A44-C4C1CDF4564F}" dt="2024-10-31T17:57:22.515" v="72" actId="478"/>
-          <ac:spMkLst>
-            <pc:docMk/>
-            <pc:sldMk cId="1741448281" sldId="258"/>
-            <ac:spMk id="1068" creationId="{D2B47835-8423-CDCA-EAAC-10613E1CDB72}"/>
-          </ac:spMkLst>
-        </pc:spChg>
-        <pc:spChg chg="del mod topLvl">
-          <ac:chgData name="George Hariman" userId="944226f4-c0bd-444e-8152-728ae792d6b1" providerId="ADAL" clId="{6C466113-2838-427E-8A44-C4C1CDF4564F}" dt="2024-10-31T17:57:22.515" v="72" actId="478"/>
-          <ac:spMkLst>
-            <pc:docMk/>
-            <pc:sldMk cId="1741448281" sldId="258"/>
-            <ac:spMk id="1084" creationId="{FAF1F571-5F5D-C3BC-4D1C-B773A05C69B2}"/>
-          </ac:spMkLst>
-        </pc:spChg>
-        <pc:spChg chg="del mod topLvl">
-          <ac:chgData name="George Hariman" userId="944226f4-c0bd-444e-8152-728ae792d6b1" providerId="ADAL" clId="{6C466113-2838-427E-8A44-C4C1CDF4564F}" dt="2024-10-31T17:57:22.515" v="72" actId="478"/>
-          <ac:spMkLst>
-            <pc:docMk/>
-            <pc:sldMk cId="1741448281" sldId="258"/>
-            <ac:spMk id="1086" creationId="{9B981969-3AA2-7314-C239-F2C4CE8AAF92}"/>
-          </ac:spMkLst>
-        </pc:spChg>
-        <pc:spChg chg="del mod topLvl">
-          <ac:chgData name="George Hariman" userId="944226f4-c0bd-444e-8152-728ae792d6b1" providerId="ADAL" clId="{6C466113-2838-427E-8A44-C4C1CDF4564F}" dt="2024-10-31T17:57:22.515" v="72" actId="478"/>
-          <ac:spMkLst>
-            <pc:docMk/>
-            <pc:sldMk cId="1741448281" sldId="258"/>
-            <ac:spMk id="1090" creationId="{CD5C4FA6-1665-D086-8DED-4C02422B8BC2}"/>
-          </ac:spMkLst>
-        </pc:spChg>
-        <pc:spChg chg="del mod topLvl">
-          <ac:chgData name="George Hariman" userId="944226f4-c0bd-444e-8152-728ae792d6b1" providerId="ADAL" clId="{6C466113-2838-427E-8A44-C4C1CDF4564F}" dt="2024-10-31T17:57:22.515" v="72" actId="478"/>
-          <ac:spMkLst>
-            <pc:docMk/>
-            <pc:sldMk cId="1741448281" sldId="258"/>
-            <ac:spMk id="1091" creationId="{8C16DA73-202C-DB85-E7BA-31323AC4268E}"/>
-          </ac:spMkLst>
-        </pc:spChg>
-        <pc:spChg chg="del mod topLvl">
-          <ac:chgData name="George Hariman" userId="944226f4-c0bd-444e-8152-728ae792d6b1" providerId="ADAL" clId="{6C466113-2838-427E-8A44-C4C1CDF4564F}" dt="2024-10-31T17:57:22.515" v="72" actId="478"/>
-          <ac:spMkLst>
-            <pc:docMk/>
-            <pc:sldMk cId="1741448281" sldId="258"/>
-            <ac:spMk id="1092" creationId="{0C902788-37BA-9966-E8D5-C1BC8B863189}"/>
-          </ac:spMkLst>
-        </pc:spChg>
-        <pc:spChg chg="del mod topLvl">
-          <ac:chgData name="George Hariman" userId="944226f4-c0bd-444e-8152-728ae792d6b1" providerId="ADAL" clId="{6C466113-2838-427E-8A44-C4C1CDF4564F}" dt="2024-10-31T17:57:22.515" v="72" actId="478"/>
-          <ac:spMkLst>
-            <pc:docMk/>
-            <pc:sldMk cId="1741448281" sldId="258"/>
-            <ac:spMk id="1093" creationId="{B62F5FCD-34F7-05C8-DBDF-7AAD85F710C3}"/>
-          </ac:spMkLst>
-        </pc:spChg>
-        <pc:spChg chg="del mod topLvl">
-          <ac:chgData name="George Hariman" userId="944226f4-c0bd-444e-8152-728ae792d6b1" providerId="ADAL" clId="{6C466113-2838-427E-8A44-C4C1CDF4564F}" dt="2024-10-31T17:57:22.515" v="72" actId="478"/>
-          <ac:spMkLst>
-            <pc:docMk/>
-            <pc:sldMk cId="1741448281" sldId="258"/>
-            <ac:spMk id="1094" creationId="{DA046F05-1CC3-8118-FE03-EBA0980D4D08}"/>
-          </ac:spMkLst>
-        </pc:spChg>
-        <pc:spChg chg="del">
-          <ac:chgData name="George Hariman" userId="944226f4-c0bd-444e-8152-728ae792d6b1" providerId="ADAL" clId="{6C466113-2838-427E-8A44-C4C1CDF4564F}" dt="2024-10-31T17:57:22.515" v="72" actId="478"/>
-          <ac:spMkLst>
-            <pc:docMk/>
-            <pc:sldMk cId="1741448281" sldId="258"/>
-            <ac:spMk id="1105" creationId="{BB797536-F5F6-4999-BE21-C7ABB80BC663}"/>
-          </ac:spMkLst>
-        </pc:spChg>
-        <pc:grpChg chg="add mod">
-          <ac:chgData name="George Hariman" userId="944226f4-c0bd-444e-8152-728ae792d6b1" providerId="ADAL" clId="{6C466113-2838-427E-8A44-C4C1CDF4564F}" dt="2024-10-31T18:08:40.111" v="703" actId="164"/>
-          <ac:grpSpMkLst>
-            <pc:docMk/>
-            <pc:sldMk cId="1741448281" sldId="258"/>
-            <ac:grpSpMk id="15" creationId="{96D4B9FA-D1A6-43F8-02AA-6FEB97112945}"/>
-          </ac:grpSpMkLst>
-        </pc:grpChg>
-        <pc:grpChg chg="del">
-          <ac:chgData name="George Hariman" userId="944226f4-c0bd-444e-8152-728ae792d6b1" providerId="ADAL" clId="{6C466113-2838-427E-8A44-C4C1CDF4564F}" dt="2024-10-31T17:56:20.900" v="62" actId="165"/>
-          <ac:grpSpMkLst>
-            <pc:docMk/>
-            <pc:sldMk cId="1741448281" sldId="258"/>
-            <ac:grpSpMk id="1095" creationId="{F29F6B25-CC1D-6637-9DDD-C9EBA027480D}"/>
-          </ac:grpSpMkLst>
-        </pc:grpChg>
-        <pc:graphicFrameChg chg="add mod modGraphic">
-          <ac:chgData name="George Hariman" userId="944226f4-c0bd-444e-8152-728ae792d6b1" providerId="ADAL" clId="{6C466113-2838-427E-8A44-C4C1CDF4564F}" dt="2024-10-31T18:10:34.772" v="727" actId="20577"/>
-          <ac:graphicFrameMkLst>
-            <pc:docMk/>
-            <pc:sldMk cId="1741448281" sldId="258"/>
-            <ac:graphicFrameMk id="8" creationId="{997BCEB1-B226-B555-257B-03AC119689F6}"/>
-          </ac:graphicFrameMkLst>
-        </pc:graphicFrameChg>
-        <pc:picChg chg="add del mod ord">
-          <ac:chgData name="George Hariman" userId="944226f4-c0bd-444e-8152-728ae792d6b1" providerId="ADAL" clId="{6C466113-2838-427E-8A44-C4C1CDF4564F}" dt="2024-10-31T17:57:20.015" v="71" actId="21"/>
-          <ac:picMkLst>
-            <pc:docMk/>
-            <pc:sldMk cId="1741448281" sldId="258"/>
-            <ac:picMk id="4" creationId="{12E481F1-6D9D-8920-2A50-84C2021D586F}"/>
-          </ac:picMkLst>
-        </pc:picChg>
-        <pc:picChg chg="add mod">
-          <ac:chgData name="George Hariman" userId="944226f4-c0bd-444e-8152-728ae792d6b1" providerId="ADAL" clId="{6C466113-2838-427E-8A44-C4C1CDF4564F}" dt="2024-10-31T18:08:40.111" v="703" actId="164"/>
-          <ac:picMkLst>
-            <pc:docMk/>
-            <pc:sldMk cId="1741448281" sldId="258"/>
-            <ac:picMk id="5" creationId="{12E481F1-6D9D-8920-2A50-84C2021D586F}"/>
-          </ac:picMkLst>
-        </pc:picChg>
-        <pc:picChg chg="add del mod">
-          <ac:chgData name="George Hariman" userId="944226f4-c0bd-444e-8152-728ae792d6b1" providerId="ADAL" clId="{6C466113-2838-427E-8A44-C4C1CDF4564F}" dt="2024-10-31T18:01:42.575" v="183" actId="478"/>
-          <ac:picMkLst>
-            <pc:docMk/>
-            <pc:sldMk cId="1741448281" sldId="258"/>
-            <ac:picMk id="11" creationId="{238B5527-5BF3-9CA2-DBD1-2ED05B434BB4}"/>
-          </ac:picMkLst>
-        </pc:picChg>
-        <pc:picChg chg="del mod topLvl">
-          <ac:chgData name="George Hariman" userId="944226f4-c0bd-444e-8152-728ae792d6b1" providerId="ADAL" clId="{6C466113-2838-427E-8A44-C4C1CDF4564F}" dt="2024-10-31T17:56:37.342" v="63" actId="478"/>
-          <ac:picMkLst>
-            <pc:docMk/>
-            <pc:sldMk cId="1741448281" sldId="258"/>
-            <ac:picMk id="1026" creationId="{A95F3349-9424-C05F-382F-88E0D7470517}"/>
-          </ac:picMkLst>
-        </pc:picChg>
-        <pc:picChg chg="del mod topLvl">
-          <ac:chgData name="George Hariman" userId="944226f4-c0bd-444e-8152-728ae792d6b1" providerId="ADAL" clId="{6C466113-2838-427E-8A44-C4C1CDF4564F}" dt="2024-10-31T17:57:22.515" v="72" actId="478"/>
-          <ac:picMkLst>
-            <pc:docMk/>
-            <pc:sldMk cId="1741448281" sldId="258"/>
-            <ac:picMk id="1028" creationId="{5062675F-64B2-238E-F8C0-0E4F64A2A29B}"/>
-          </ac:picMkLst>
-        </pc:picChg>
-        <pc:picChg chg="del mod topLvl">
-          <ac:chgData name="George Hariman" userId="944226f4-c0bd-444e-8152-728ae792d6b1" providerId="ADAL" clId="{6C466113-2838-427E-8A44-C4C1CDF4564F}" dt="2024-10-31T17:57:22.515" v="72" actId="478"/>
-          <ac:picMkLst>
-            <pc:docMk/>
-            <pc:sldMk cId="1741448281" sldId="258"/>
-            <ac:picMk id="1051" creationId="{2D2938FE-6DF0-8217-8B99-D8F0235F8C48}"/>
-          </ac:picMkLst>
-        </pc:picChg>
-        <pc:picChg chg="del mod topLvl">
-          <ac:chgData name="George Hariman" userId="944226f4-c0bd-444e-8152-728ae792d6b1" providerId="ADAL" clId="{6C466113-2838-427E-8A44-C4C1CDF4564F}" dt="2024-10-31T17:57:22.515" v="72" actId="478"/>
-          <ac:picMkLst>
-            <pc:docMk/>
-            <pc:sldMk cId="1741448281" sldId="258"/>
-            <ac:picMk id="1059" creationId="{99E3A4EA-2311-462D-E53D-FDB880A00F51}"/>
-          </ac:picMkLst>
-        </pc:picChg>
-        <pc:picChg chg="del mod topLvl">
-          <ac:chgData name="George Hariman" userId="944226f4-c0bd-444e-8152-728ae792d6b1" providerId="ADAL" clId="{6C466113-2838-427E-8A44-C4C1CDF4564F}" dt="2024-10-31T17:57:22.515" v="72" actId="478"/>
-          <ac:picMkLst>
-            <pc:docMk/>
-            <pc:sldMk cId="1741448281" sldId="258"/>
-            <ac:picMk id="1085" creationId="{D999B144-428A-43E9-7BB2-1B2A4416A6EC}"/>
-          </ac:picMkLst>
-        </pc:picChg>
-        <pc:cxnChg chg="del mod topLvl">
-          <ac:chgData name="George Hariman" userId="944226f4-c0bd-444e-8152-728ae792d6b1" providerId="ADAL" clId="{6C466113-2838-427E-8A44-C4C1CDF4564F}" dt="2024-10-31T17:57:22.515" v="72" actId="478"/>
-          <ac:cxnSpMkLst>
-            <pc:docMk/>
-            <pc:sldMk cId="1741448281" sldId="258"/>
-            <ac:cxnSpMk id="6" creationId="{0857D4F4-9F12-DC22-E019-BA82A55B7CA3}"/>
-          </ac:cxnSpMkLst>
-        </pc:cxnChg>
-        <pc:cxnChg chg="del mod topLvl">
-          <ac:chgData name="George Hariman" userId="944226f4-c0bd-444e-8152-728ae792d6b1" providerId="ADAL" clId="{6C466113-2838-427E-8A44-C4C1CDF4564F}" dt="2024-10-31T17:57:22.515" v="72" actId="478"/>
-          <ac:cxnSpMkLst>
-            <pc:docMk/>
-            <pc:sldMk cId="1741448281" sldId="258"/>
-            <ac:cxnSpMk id="7" creationId="{567926F0-BCEA-A66D-3C0F-D750A69A2C76}"/>
-          </ac:cxnSpMkLst>
-        </pc:cxnChg>
-        <pc:cxnChg chg="del mod topLvl">
-          <ac:chgData name="George Hariman" userId="944226f4-c0bd-444e-8152-728ae792d6b1" providerId="ADAL" clId="{6C466113-2838-427E-8A44-C4C1CDF4564F}" dt="2024-10-31T17:57:22.515" v="72" actId="478"/>
-          <ac:cxnSpMkLst>
-            <pc:docMk/>
-            <pc:sldMk cId="1741448281" sldId="258"/>
-            <ac:cxnSpMk id="17" creationId="{331469A3-F411-225C-975F-52E4C41E8088}"/>
-          </ac:cxnSpMkLst>
-        </pc:cxnChg>
-        <pc:cxnChg chg="del mod topLvl">
-          <ac:chgData name="George Hariman" userId="944226f4-c0bd-444e-8152-728ae792d6b1" providerId="ADAL" clId="{6C466113-2838-427E-8A44-C4C1CDF4564F}" dt="2024-10-31T17:57:22.515" v="72" actId="478"/>
-          <ac:cxnSpMkLst>
-            <pc:docMk/>
-            <pc:sldMk cId="1741448281" sldId="258"/>
-            <ac:cxnSpMk id="26" creationId="{5C6925C5-62B8-2CA9-F46B-CFEFC995CC02}"/>
-          </ac:cxnSpMkLst>
-        </pc:cxnChg>
-        <pc:cxnChg chg="del mod topLvl">
-          <ac:chgData name="George Hariman" userId="944226f4-c0bd-444e-8152-728ae792d6b1" providerId="ADAL" clId="{6C466113-2838-427E-8A44-C4C1CDF4564F}" dt="2024-10-31T17:57:22.515" v="72" actId="478"/>
-          <ac:cxnSpMkLst>
-            <pc:docMk/>
-            <pc:sldMk cId="1741448281" sldId="258"/>
-            <ac:cxnSpMk id="29" creationId="{F90A99FE-C926-5124-0BE4-CC16166FC1E7}"/>
-          </ac:cxnSpMkLst>
-        </pc:cxnChg>
-        <pc:cxnChg chg="del mod topLvl">
-          <ac:chgData name="George Hariman" userId="944226f4-c0bd-444e-8152-728ae792d6b1" providerId="ADAL" clId="{6C466113-2838-427E-8A44-C4C1CDF4564F}" dt="2024-10-31T17:57:22.515" v="72" actId="478"/>
-          <ac:cxnSpMkLst>
-            <pc:docMk/>
-            <pc:sldMk cId="1741448281" sldId="258"/>
-            <ac:cxnSpMk id="1025" creationId="{E46229AF-23E2-08E5-5640-978F325F39CA}"/>
-          </ac:cxnSpMkLst>
-        </pc:cxnChg>
-        <pc:cxnChg chg="del mod topLvl">
-          <ac:chgData name="George Hariman" userId="944226f4-c0bd-444e-8152-728ae792d6b1" providerId="ADAL" clId="{6C466113-2838-427E-8A44-C4C1CDF4564F}" dt="2024-10-31T17:57:22.515" v="72" actId="478"/>
-          <ac:cxnSpMkLst>
-            <pc:docMk/>
-            <pc:sldMk cId="1741448281" sldId="258"/>
-            <ac:cxnSpMk id="1033" creationId="{DBA48666-C186-3E3C-58FC-53824141CB8F}"/>
-          </ac:cxnSpMkLst>
-        </pc:cxnChg>
-        <pc:cxnChg chg="del mod topLvl">
-          <ac:chgData name="George Hariman" userId="944226f4-c0bd-444e-8152-728ae792d6b1" providerId="ADAL" clId="{6C466113-2838-427E-8A44-C4C1CDF4564F}" dt="2024-10-31T17:57:22.515" v="72" actId="478"/>
-          <ac:cxnSpMkLst>
-            <pc:docMk/>
-            <pc:sldMk cId="1741448281" sldId="258"/>
-            <ac:cxnSpMk id="1035" creationId="{B4F0750B-8A34-5BEC-F5AC-EDF82FCA40E7}"/>
-          </ac:cxnSpMkLst>
-        </pc:cxnChg>
-        <pc:cxnChg chg="del mod topLvl">
-          <ac:chgData name="George Hariman" userId="944226f4-c0bd-444e-8152-728ae792d6b1" providerId="ADAL" clId="{6C466113-2838-427E-8A44-C4C1CDF4564F}" dt="2024-10-31T17:57:22.515" v="72" actId="478"/>
-          <ac:cxnSpMkLst>
-            <pc:docMk/>
-            <pc:sldMk cId="1741448281" sldId="258"/>
-            <ac:cxnSpMk id="1042" creationId="{E3243B1D-23A5-99AD-7912-8F7BC0FC83C5}"/>
-          </ac:cxnSpMkLst>
-        </pc:cxnChg>
-        <pc:cxnChg chg="del mod topLvl">
-          <ac:chgData name="George Hariman" userId="944226f4-c0bd-444e-8152-728ae792d6b1" providerId="ADAL" clId="{6C466113-2838-427E-8A44-C4C1CDF4564F}" dt="2024-10-31T17:57:22.515" v="72" actId="478"/>
-          <ac:cxnSpMkLst>
-            <pc:docMk/>
-            <pc:sldMk cId="1741448281" sldId="258"/>
-            <ac:cxnSpMk id="1044" creationId="{3F77CA9E-C289-0606-8652-478B3043FFBC}"/>
-          </ac:cxnSpMkLst>
-        </pc:cxnChg>
-        <pc:cxnChg chg="del mod topLvl">
-          <ac:chgData name="George Hariman" userId="944226f4-c0bd-444e-8152-728ae792d6b1" providerId="ADAL" clId="{6C466113-2838-427E-8A44-C4C1CDF4564F}" dt="2024-10-31T17:57:22.515" v="72" actId="478"/>
-          <ac:cxnSpMkLst>
-            <pc:docMk/>
-            <pc:sldMk cId="1741448281" sldId="258"/>
-            <ac:cxnSpMk id="1052" creationId="{060EED95-DCB9-D7CD-EDFF-9BCB729DB8D7}"/>
-          </ac:cxnSpMkLst>
-        </pc:cxnChg>
-        <pc:cxnChg chg="del mod topLvl">
-          <ac:chgData name="George Hariman" userId="944226f4-c0bd-444e-8152-728ae792d6b1" providerId="ADAL" clId="{6C466113-2838-427E-8A44-C4C1CDF4564F}" dt="2024-10-31T17:57:22.515" v="72" actId="478"/>
-          <ac:cxnSpMkLst>
-            <pc:docMk/>
-            <pc:sldMk cId="1741448281" sldId="258"/>
-            <ac:cxnSpMk id="1064" creationId="{75CC5CB9-C4C3-42DC-1216-AC03E61BA30F}"/>
-          </ac:cxnSpMkLst>
-        </pc:cxnChg>
-        <pc:cxnChg chg="del mod topLvl">
-          <ac:chgData name="George Hariman" userId="944226f4-c0bd-444e-8152-728ae792d6b1" providerId="ADAL" clId="{6C466113-2838-427E-8A44-C4C1CDF4564F}" dt="2024-10-31T17:57:22.515" v="72" actId="478"/>
-          <ac:cxnSpMkLst>
-            <pc:docMk/>
-            <pc:sldMk cId="1741448281" sldId="258"/>
-            <ac:cxnSpMk id="1072" creationId="{BF633024-B2D7-014B-8416-9092561C46D7}"/>
-          </ac:cxnSpMkLst>
-        </pc:cxnChg>
-        <pc:cxnChg chg="del mod topLvl">
-          <ac:chgData name="George Hariman" userId="944226f4-c0bd-444e-8152-728ae792d6b1" providerId="ADAL" clId="{6C466113-2838-427E-8A44-C4C1CDF4564F}" dt="2024-10-31T17:57:22.515" v="72" actId="478"/>
-          <ac:cxnSpMkLst>
-            <pc:docMk/>
-            <pc:sldMk cId="1741448281" sldId="258"/>
-            <ac:cxnSpMk id="1074" creationId="{AE3BB2B1-4A05-B28C-2B04-F9AF80F4D8F2}"/>
-          </ac:cxnSpMkLst>
-        </pc:cxnChg>
       </pc:sldChg>
       <pc:sldChg chg="addSp modSp new mod">
         <pc:chgData name="George Hariman" userId="944226f4-c0bd-444e-8152-728ae792d6b1" providerId="ADAL" clId="{6C466113-2838-427E-8A44-C4C1CDF4564F}" dt="2024-10-31T18:08:28.699" v="702" actId="164"/>
@@ -1460,94 +596,6 @@
           <pc:docMk/>
           <pc:sldMk cId="1946515810" sldId="259"/>
         </pc:sldMkLst>
-        <pc:spChg chg="mod">
-          <ac:chgData name="George Hariman" userId="944226f4-c0bd-444e-8152-728ae792d6b1" providerId="ADAL" clId="{6C466113-2838-427E-8A44-C4C1CDF4564F}" dt="2024-10-31T18:04:34.559" v="329" actId="313"/>
-          <ac:spMkLst>
-            <pc:docMk/>
-            <pc:sldMk cId="1946515810" sldId="259"/>
-            <ac:spMk id="2" creationId="{63080D9B-942C-96EF-9369-9AC36DE20DAE}"/>
-          </ac:spMkLst>
-        </pc:spChg>
-        <pc:spChg chg="add mod">
-          <ac:chgData name="George Hariman" userId="944226f4-c0bd-444e-8152-728ae792d6b1" providerId="ADAL" clId="{6C466113-2838-427E-8A44-C4C1CDF4564F}" dt="2024-10-31T18:08:28.699" v="702" actId="164"/>
-          <ac:spMkLst>
-            <pc:docMk/>
-            <pc:sldMk cId="1946515810" sldId="259"/>
-            <ac:spMk id="5" creationId="{E3992AEA-96E9-087A-5105-909A8ACF632F}"/>
-          </ac:spMkLst>
-        </pc:spChg>
-        <pc:spChg chg="add mod">
-          <ac:chgData name="George Hariman" userId="944226f4-c0bd-444e-8152-728ae792d6b1" providerId="ADAL" clId="{6C466113-2838-427E-8A44-C4C1CDF4564F}" dt="2024-10-31T18:08:28.699" v="702" actId="164"/>
-          <ac:spMkLst>
-            <pc:docMk/>
-            <pc:sldMk cId="1946515810" sldId="259"/>
-            <ac:spMk id="6" creationId="{5FF3E601-87A0-53A7-A4F4-B5A7624BE133}"/>
-          </ac:spMkLst>
-        </pc:spChg>
-        <pc:spChg chg="add mod">
-          <ac:chgData name="George Hariman" userId="944226f4-c0bd-444e-8152-728ae792d6b1" providerId="ADAL" clId="{6C466113-2838-427E-8A44-C4C1CDF4564F}" dt="2024-10-31T18:08:28.699" v="702" actId="164"/>
-          <ac:spMkLst>
-            <pc:docMk/>
-            <pc:sldMk cId="1946515810" sldId="259"/>
-            <ac:spMk id="7" creationId="{A21F66F5-241F-5CBA-77E3-00FB80F2858C}"/>
-          </ac:spMkLst>
-        </pc:spChg>
-        <pc:spChg chg="add mod">
-          <ac:chgData name="George Hariman" userId="944226f4-c0bd-444e-8152-728ae792d6b1" providerId="ADAL" clId="{6C466113-2838-427E-8A44-C4C1CDF4564F}" dt="2024-10-31T18:08:28.699" v="702" actId="164"/>
-          <ac:spMkLst>
-            <pc:docMk/>
-            <pc:sldMk cId="1946515810" sldId="259"/>
-            <ac:spMk id="8" creationId="{3496BBC1-7AA7-7933-82B5-5756CB4D833B}"/>
-          </ac:spMkLst>
-        </pc:spChg>
-        <pc:spChg chg="add mod">
-          <ac:chgData name="George Hariman" userId="944226f4-c0bd-444e-8152-728ae792d6b1" providerId="ADAL" clId="{6C466113-2838-427E-8A44-C4C1CDF4564F}" dt="2024-10-31T18:08:28.699" v="702" actId="164"/>
-          <ac:spMkLst>
-            <pc:docMk/>
-            <pc:sldMk cId="1946515810" sldId="259"/>
-            <ac:spMk id="9" creationId="{574FA0D2-5365-E25E-7D27-FCAC3EEBA89E}"/>
-          </ac:spMkLst>
-        </pc:spChg>
-        <pc:spChg chg="add mod">
-          <ac:chgData name="George Hariman" userId="944226f4-c0bd-444e-8152-728ae792d6b1" providerId="ADAL" clId="{6C466113-2838-427E-8A44-C4C1CDF4564F}" dt="2024-10-31T18:08:28.699" v="702" actId="164"/>
-          <ac:spMkLst>
-            <pc:docMk/>
-            <pc:sldMk cId="1946515810" sldId="259"/>
-            <ac:spMk id="10" creationId="{E3F32478-D421-A236-25AE-3FF6A7E77DE2}"/>
-          </ac:spMkLst>
-        </pc:spChg>
-        <pc:spChg chg="add mod">
-          <ac:chgData name="George Hariman" userId="944226f4-c0bd-444e-8152-728ae792d6b1" providerId="ADAL" clId="{6C466113-2838-427E-8A44-C4C1CDF4564F}" dt="2024-10-31T18:08:28.699" v="702" actId="164"/>
-          <ac:spMkLst>
-            <pc:docMk/>
-            <pc:sldMk cId="1946515810" sldId="259"/>
-            <ac:spMk id="11" creationId="{BD2ACE03-4889-E9C5-A7D9-5076E6C8D512}"/>
-          </ac:spMkLst>
-        </pc:spChg>
-        <pc:spChg chg="add mod">
-          <ac:chgData name="George Hariman" userId="944226f4-c0bd-444e-8152-728ae792d6b1" providerId="ADAL" clId="{6C466113-2838-427E-8A44-C4C1CDF4564F}" dt="2024-10-31T18:08:28.699" v="702" actId="164"/>
-          <ac:spMkLst>
-            <pc:docMk/>
-            <pc:sldMk cId="1946515810" sldId="259"/>
-            <ac:spMk id="12" creationId="{C154E8F7-DA25-73FC-AFF5-5D085F093CC0}"/>
-          </ac:spMkLst>
-        </pc:spChg>
-        <pc:grpChg chg="add mod">
-          <ac:chgData name="George Hariman" userId="944226f4-c0bd-444e-8152-728ae792d6b1" providerId="ADAL" clId="{6C466113-2838-427E-8A44-C4C1CDF4564F}" dt="2024-10-31T18:08:28.699" v="702" actId="164"/>
-          <ac:grpSpMkLst>
-            <pc:docMk/>
-            <pc:sldMk cId="1946515810" sldId="259"/>
-            <ac:grpSpMk id="13" creationId="{3D8D10A3-9F8E-73AA-83EB-8A1442DD612F}"/>
-          </ac:grpSpMkLst>
-        </pc:grpChg>
-        <pc:picChg chg="add mod">
-          <ac:chgData name="George Hariman" userId="944226f4-c0bd-444e-8152-728ae792d6b1" providerId="ADAL" clId="{6C466113-2838-427E-8A44-C4C1CDF4564F}" dt="2024-10-31T18:08:28.699" v="702" actId="164"/>
-          <ac:picMkLst>
-            <pc:docMk/>
-            <pc:sldMk cId="1946515810" sldId="259"/>
-            <ac:picMk id="4" creationId="{EABB0EF2-88F6-E1AA-6C8D-A3EA81E8C2A6}"/>
-          </ac:picMkLst>
-        </pc:picChg>
       </pc:sldChg>
       <pc:sldChg chg="add del">
         <pc:chgData name="George Hariman" userId="944226f4-c0bd-444e-8152-728ae792d6b1" providerId="ADAL" clId="{6C466113-2838-427E-8A44-C4C1CDF4564F}" dt="2024-10-31T18:04:27.914" v="306" actId="2890"/>
@@ -6745,7 +5793,7 @@
           <p:spPr>
             <a:xfrm>
               <a:off x="100668" y="4018327"/>
-              <a:ext cx="2081019" cy="369332"/>
+              <a:ext cx="2131866" cy="369332"/>
             </a:xfrm>
             <a:prstGeom prst="rect">
               <a:avLst/>
@@ -6774,7 +5822,7 @@
                   <a:ea typeface="+mn-ea"/>
                   <a:cs typeface="メイリオ" panose="020B0604030504040204" pitchFamily="50" charset="-128"/>
                 </a:rPr>
-                <a:t>BD63150FM EVK</a:t>
+                <a:t>BD64950EFJ EVK</a:t>
               </a:r>
             </a:p>
           </p:txBody>
@@ -7089,6 +6137,115 @@
               </a:rPr>
               <a:t>5V</a:t>
             </a:r>
+          </a:p>
+        </p:txBody>
+      </p:sp>
+      <p:sp>
+        <p:nvSpPr>
+          <p:cNvPr id="3" name="TextBox 2">
+            <a:extLst>
+              <a:ext uri="{FF2B5EF4-FFF2-40B4-BE49-F238E27FC236}">
+                <a16:creationId xmlns:a16="http://schemas.microsoft.com/office/drawing/2014/main" id="{92270134-3C78-86EA-38D4-40F961DC282A}"/>
+              </a:ext>
+            </a:extLst>
+          </p:cNvPr>
+          <p:cNvSpPr txBox="1"/>
+          <p:nvPr/>
+        </p:nvSpPr>
+        <p:spPr>
+          <a:xfrm>
+            <a:off x="7922883" y="0"/>
+            <a:ext cx="4269117" cy="923330"/>
+          </a:xfrm>
+          <a:prstGeom prst="rect">
+            <a:avLst/>
+          </a:prstGeom>
+          <a:solidFill>
+            <a:schemeClr val="bg1"/>
+          </a:solidFill>
+        </p:spPr>
+        <p:txBody>
+          <a:bodyPr wrap="none" rtlCol="0">
+            <a:spAutoFit/>
+          </a:bodyPr>
+          <a:lstStyle/>
+          <a:p>
+            <a:pPr>
+              <a:spcBef>
+                <a:spcPts val="400"/>
+              </a:spcBef>
+            </a:pPr>
+            <a:r>
+              <a:rPr kumimoji="1" lang="en-US" sz="1800" dirty="0">
+                <a:solidFill>
+                  <a:schemeClr val="tx2"/>
+                </a:solidFill>
+                <a:latin typeface="+mn-ea"/>
+                <a:ea typeface="+mn-ea"/>
+                <a:cs typeface="メイリオ" panose="020B0604030504040204" pitchFamily="50" charset="-128"/>
+              </a:rPr>
+              <a:t>DCDC:</a:t>
+            </a:r>
+            <a:br>
+              <a:rPr kumimoji="1" lang="en-US" sz="1800" dirty="0">
+                <a:solidFill>
+                  <a:schemeClr val="tx2"/>
+                </a:solidFill>
+                <a:latin typeface="+mn-ea"/>
+                <a:ea typeface="+mn-ea"/>
+                <a:cs typeface="メイリオ" panose="020B0604030504040204" pitchFamily="50" charset="-128"/>
+              </a:rPr>
+            </a:br>
+            <a:r>
+              <a:rPr kumimoji="1" lang="en-US" sz="1800" dirty="0">
+                <a:solidFill>
+                  <a:schemeClr val="tx2"/>
+                </a:solidFill>
+                <a:latin typeface="+mn-ea"/>
+                <a:ea typeface="+mn-ea"/>
+                <a:cs typeface="メイリオ" panose="020B0604030504040204" pitchFamily="50" charset="-128"/>
+              </a:rPr>
+              <a:t>BD9E202FP4-EVK-001 (12V to 5V)</a:t>
+            </a:r>
+            <a:br>
+              <a:rPr kumimoji="1" lang="en-US" sz="1800" dirty="0">
+                <a:solidFill>
+                  <a:schemeClr val="tx2"/>
+                </a:solidFill>
+                <a:latin typeface="+mn-ea"/>
+                <a:ea typeface="+mn-ea"/>
+                <a:cs typeface="メイリオ" panose="020B0604030504040204" pitchFamily="50" charset="-128"/>
+              </a:rPr>
+            </a:br>
+            <a:r>
+              <a:rPr kumimoji="1" lang="en-US" sz="1800" dirty="0">
+                <a:solidFill>
+                  <a:schemeClr val="tx2"/>
+                </a:solidFill>
+                <a:latin typeface="+mn-ea"/>
+                <a:ea typeface="+mn-ea"/>
+                <a:cs typeface="メイリオ" panose="020B0604030504040204" pitchFamily="50" charset="-128"/>
+              </a:rPr>
+              <a:t>BD9E304FP4-EVK-002 (24V to </a:t>
+            </a:r>
+            <a:r>
+              <a:rPr lang="en-US" dirty="0">
+                <a:solidFill>
+                  <a:schemeClr val="tx2"/>
+                </a:solidFill>
+                <a:latin typeface="+mn-ea"/>
+                <a:cs typeface="メイリオ" panose="020B0604030504040204" pitchFamily="50" charset="-128"/>
+              </a:rPr>
+              <a:t>12V)</a:t>
+            </a:r>
+            <a:endParaRPr kumimoji="1" lang="en-US" sz="1800" dirty="0">
+              <a:solidFill>
+                <a:schemeClr val="tx2"/>
+              </a:solidFill>
+              <a:latin typeface="+mn-ea"/>
+              <a:ea typeface="+mn-ea"/>
+              <a:cs typeface="メイリオ" panose="020B0604030504040204" pitchFamily="50" charset="-128"/>
+            </a:endParaRPr>
           </a:p>
         </p:txBody>
       </p:sp>

</xml_diff>